<commit_message>
updated comparison slides with STL comparison values
</commit_message>
<xml_diff>
--- a/papers/ComparisonSlide11Oct.pptx
+++ b/papers/ComparisonSlide11Oct.pptx
@@ -5,16 +5,20 @@
     <p:sldMasterId id="2147483648" r:id="rId1"/>
   </p:sldMasterIdLst>
   <p:notesMasterIdLst>
-    <p:notesMasterId r:id="rId6"/>
+    <p:notesMasterId r:id="rId10"/>
   </p:notesMasterIdLst>
   <p:handoutMasterIdLst>
-    <p:handoutMasterId r:id="rId7"/>
+    <p:handoutMasterId r:id="rId11"/>
   </p:handoutMasterIdLst>
   <p:sldIdLst>
     <p:sldId id="256" r:id="rId2"/>
-    <p:sldId id="259" r:id="rId3"/>
-    <p:sldId id="257" r:id="rId4"/>
-    <p:sldId id="258" r:id="rId5"/>
+    <p:sldId id="263" r:id="rId3"/>
+    <p:sldId id="264" r:id="rId4"/>
+    <p:sldId id="265" r:id="rId5"/>
+    <p:sldId id="261" r:id="rId6"/>
+    <p:sldId id="259" r:id="rId7"/>
+    <p:sldId id="257" r:id="rId8"/>
+    <p:sldId id="258" r:id="rId9"/>
   </p:sldIdLst>
   <p:sldSz cx="10080625" cy="5670550"/>
   <p:notesSz cx="7772400" cy="10058400"/>
@@ -957,7 +961,7 @@
           <a:p>
             <a:pPr lvl="0"/>
             <a:fld id="{E9625CB8-1CC2-490B-B45F-1AADA9F9165D}" type="slidenum">
-              <a:t>2</a:t>
+              <a:t>6</a:t>
             </a:fld>
             <a:endParaRPr lang="en-US"/>
           </a:p>
@@ -1077,7 +1081,7 @@
           <a:p>
             <a:pPr lvl="0"/>
             <a:fld id="{B1735628-FC1A-4F43-B44E-46B901F62798}" type="slidenum">
-              <a:t>3</a:t>
+              <a:t>7</a:t>
             </a:fld>
             <a:endParaRPr lang="en-US"/>
           </a:p>
@@ -5578,6 +5582,1430 @@
           <a:chExt cx="0" cy="0"/>
         </a:xfrm>
       </p:grpSpPr>
+      <p:graphicFrame>
+        <p:nvGraphicFramePr>
+          <p:cNvPr id="4" name="Table 4">
+            <a:extLst>
+              <a:ext uri="{FF2B5EF4-FFF2-40B4-BE49-F238E27FC236}">
+                <a16:creationId xmlns:a16="http://schemas.microsoft.com/office/drawing/2014/main" id="{7098E8ED-CAEB-4C65-A84A-B56340DD2B08}"/>
+              </a:ext>
+            </a:extLst>
+          </p:cNvPr>
+          <p:cNvGraphicFramePr>
+            <a:graphicFrameLocks noGrp="1"/>
+          </p:cNvGraphicFramePr>
+          <p:nvPr>
+            <p:extLst>
+              <p:ext uri="{D42A27DB-BD31-4B8C-83A1-F6EECF244321}">
+                <p14:modId xmlns:p14="http://schemas.microsoft.com/office/powerpoint/2010/main" val="651085660"/>
+              </p:ext>
+            </p:extLst>
+          </p:nvPr>
+        </p:nvGraphicFramePr>
+        <p:xfrm>
+          <a:off x="1828799" y="1062892"/>
+          <a:ext cx="6807198" cy="2954215"/>
+        </p:xfrm>
+        <a:graphic>
+          <a:graphicData uri="http://schemas.openxmlformats.org/drawingml/2006/table">
+            <a:tbl>
+              <a:tblPr firstRow="1" bandRow="1">
+                <a:tableStyleId>{5C22544A-7EE6-4342-B048-85BDC9FD1C3A}</a:tableStyleId>
+              </a:tblPr>
+              <a:tblGrid>
+                <a:gridCol w="2269066">
+                  <a:extLst>
+                    <a:ext uri="{9D8B030D-6E8A-4147-A177-3AD203B41FA5}">
+                      <a16:colId xmlns:a16="http://schemas.microsoft.com/office/drawing/2014/main" val="722819149"/>
+                    </a:ext>
+                  </a:extLst>
+                </a:gridCol>
+                <a:gridCol w="2269066">
+                  <a:extLst>
+                    <a:ext uri="{9D8B030D-6E8A-4147-A177-3AD203B41FA5}">
+                      <a16:colId xmlns:a16="http://schemas.microsoft.com/office/drawing/2014/main" val="289931920"/>
+                    </a:ext>
+                  </a:extLst>
+                </a:gridCol>
+                <a:gridCol w="2269066">
+                  <a:extLst>
+                    <a:ext uri="{9D8B030D-6E8A-4147-A177-3AD203B41FA5}">
+                      <a16:colId xmlns:a16="http://schemas.microsoft.com/office/drawing/2014/main" val="379603293"/>
+                    </a:ext>
+                  </a:extLst>
+                </a:gridCol>
+              </a:tblGrid>
+              <a:tr h="590843">
+                <a:tc>
+                  <a:txBody>
+                    <a:bodyPr/>
+                    <a:lstStyle/>
+                    <a:p>
+                      <a:pPr algn="ctr"/>
+                      <a:r>
+                        <a:rPr lang="en-US" dirty="0"/>
+                        <a:t>Metric\API</a:t>
+                      </a:r>
+                    </a:p>
+                  </a:txBody>
+                  <a:tcPr/>
+                </a:tc>
+                <a:tc>
+                  <a:txBody>
+                    <a:bodyPr/>
+                    <a:lstStyle/>
+                    <a:p>
+                      <a:pPr algn="ctr"/>
+                      <a:r>
+                        <a:rPr lang="en-US" dirty="0" err="1"/>
+                        <a:t>Seasonal_decompose</a:t>
+                      </a:r>
+                      <a:endParaRPr lang="en-US" dirty="0"/>
+                    </a:p>
+                  </a:txBody>
+                  <a:tcPr/>
+                </a:tc>
+                <a:tc>
+                  <a:txBody>
+                    <a:bodyPr/>
+                    <a:lstStyle/>
+                    <a:p>
+                      <a:pPr algn="ctr"/>
+                      <a:r>
+                        <a:rPr lang="en-US" dirty="0"/>
+                        <a:t>STL</a:t>
+                      </a:r>
+                    </a:p>
+                  </a:txBody>
+                  <a:tcPr/>
+                </a:tc>
+                <a:extLst>
+                  <a:ext uri="{0D108BD9-81ED-4DB2-BD59-A6C34878D82A}">
+                    <a16:rowId xmlns:a16="http://schemas.microsoft.com/office/drawing/2014/main" val="4157411911"/>
+                  </a:ext>
+                </a:extLst>
+              </a:tr>
+              <a:tr h="590843">
+                <a:tc>
+                  <a:txBody>
+                    <a:bodyPr/>
+                    <a:lstStyle/>
+                    <a:p>
+                      <a:pPr algn="ctr"/>
+                      <a:r>
+                        <a:rPr lang="en-US" dirty="0"/>
+                        <a:t>Precision</a:t>
+                      </a:r>
+                    </a:p>
+                  </a:txBody>
+                  <a:tcPr/>
+                </a:tc>
+                <a:tc>
+                  <a:txBody>
+                    <a:bodyPr/>
+                    <a:lstStyle/>
+                    <a:p>
+                      <a:pPr algn="ctr"/>
+                      <a:r>
+                        <a:rPr lang="en-US" dirty="0"/>
+                        <a:t>0.6495</a:t>
+                      </a:r>
+                    </a:p>
+                  </a:txBody>
+                  <a:tcPr/>
+                </a:tc>
+                <a:tc>
+                  <a:txBody>
+                    <a:bodyPr/>
+                    <a:lstStyle/>
+                    <a:p>
+                      <a:pPr algn="ctr"/>
+                      <a:r>
+                        <a:rPr lang="en-US" dirty="0"/>
+                        <a:t>0.5588</a:t>
+                      </a:r>
+                    </a:p>
+                  </a:txBody>
+                  <a:tcPr/>
+                </a:tc>
+                <a:extLst>
+                  <a:ext uri="{0D108BD9-81ED-4DB2-BD59-A6C34878D82A}">
+                    <a16:rowId xmlns:a16="http://schemas.microsoft.com/office/drawing/2014/main" val="363083633"/>
+                  </a:ext>
+                </a:extLst>
+              </a:tr>
+              <a:tr h="590843">
+                <a:tc>
+                  <a:txBody>
+                    <a:bodyPr/>
+                    <a:lstStyle/>
+                    <a:p>
+                      <a:pPr algn="ctr"/>
+                      <a:r>
+                        <a:rPr lang="en-US" dirty="0"/>
+                        <a:t>Recall</a:t>
+                      </a:r>
+                    </a:p>
+                  </a:txBody>
+                  <a:tcPr/>
+                </a:tc>
+                <a:tc>
+                  <a:txBody>
+                    <a:bodyPr/>
+                    <a:lstStyle/>
+                    <a:p>
+                      <a:pPr algn="ctr"/>
+                      <a:r>
+                        <a:rPr lang="en-US" dirty="0"/>
+                        <a:t>1</a:t>
+                      </a:r>
+                    </a:p>
+                  </a:txBody>
+                  <a:tcPr/>
+                </a:tc>
+                <a:tc>
+                  <a:txBody>
+                    <a:bodyPr/>
+                    <a:lstStyle/>
+                    <a:p>
+                      <a:pPr algn="ctr"/>
+                      <a:r>
+                        <a:rPr lang="en-US" dirty="0"/>
+                        <a:t>0.9944</a:t>
+                      </a:r>
+                    </a:p>
+                  </a:txBody>
+                  <a:tcPr/>
+                </a:tc>
+                <a:extLst>
+                  <a:ext uri="{0D108BD9-81ED-4DB2-BD59-A6C34878D82A}">
+                    <a16:rowId xmlns:a16="http://schemas.microsoft.com/office/drawing/2014/main" val="2316127732"/>
+                  </a:ext>
+                </a:extLst>
+              </a:tr>
+              <a:tr h="590843">
+                <a:tc>
+                  <a:txBody>
+                    <a:bodyPr/>
+                    <a:lstStyle/>
+                    <a:p>
+                      <a:pPr algn="ctr"/>
+                      <a:r>
+                        <a:rPr lang="en-US" dirty="0"/>
+                        <a:t>F1 Score</a:t>
+                      </a:r>
+                    </a:p>
+                  </a:txBody>
+                  <a:tcPr/>
+                </a:tc>
+                <a:tc>
+                  <a:txBody>
+                    <a:bodyPr/>
+                    <a:lstStyle/>
+                    <a:p>
+                      <a:pPr algn="ctr"/>
+                      <a:r>
+                        <a:rPr lang="en-US" dirty="0"/>
+                        <a:t>0.7068</a:t>
+                      </a:r>
+                    </a:p>
+                  </a:txBody>
+                  <a:tcPr/>
+                </a:tc>
+                <a:tc>
+                  <a:txBody>
+                    <a:bodyPr/>
+                    <a:lstStyle/>
+                    <a:p>
+                      <a:pPr algn="ctr"/>
+                      <a:r>
+                        <a:rPr lang="en-US" dirty="0"/>
+                        <a:t>0.6069</a:t>
+                      </a:r>
+                    </a:p>
+                  </a:txBody>
+                  <a:tcPr/>
+                </a:tc>
+                <a:extLst>
+                  <a:ext uri="{0D108BD9-81ED-4DB2-BD59-A6C34878D82A}">
+                    <a16:rowId xmlns:a16="http://schemas.microsoft.com/office/drawing/2014/main" val="2249889954"/>
+                  </a:ext>
+                </a:extLst>
+              </a:tr>
+              <a:tr h="590843">
+                <a:tc>
+                  <a:txBody>
+                    <a:bodyPr/>
+                    <a:lstStyle/>
+                    <a:p>
+                      <a:pPr algn="ctr"/>
+                      <a:r>
+                        <a:rPr lang="en-US" dirty="0"/>
+                        <a:t>Runtime</a:t>
+                      </a:r>
+                    </a:p>
+                  </a:txBody>
+                  <a:tcPr/>
+                </a:tc>
+                <a:tc>
+                  <a:txBody>
+                    <a:bodyPr/>
+                    <a:lstStyle/>
+                    <a:p>
+                      <a:pPr algn="ctr"/>
+                      <a:r>
+                        <a:rPr lang="en-US" dirty="0"/>
+                        <a:t>78s</a:t>
+                      </a:r>
+                    </a:p>
+                  </a:txBody>
+                  <a:tcPr/>
+                </a:tc>
+                <a:tc>
+                  <a:txBody>
+                    <a:bodyPr/>
+                    <a:lstStyle/>
+                    <a:p>
+                      <a:pPr algn="ctr"/>
+                      <a:r>
+                        <a:rPr lang="en-US" dirty="0"/>
+                        <a:t>7m:28s</a:t>
+                      </a:r>
+                    </a:p>
+                  </a:txBody>
+                  <a:tcPr/>
+                </a:tc>
+                <a:extLst>
+                  <a:ext uri="{0D108BD9-81ED-4DB2-BD59-A6C34878D82A}">
+                    <a16:rowId xmlns:a16="http://schemas.microsoft.com/office/drawing/2014/main" val="14402245"/>
+                  </a:ext>
+                </a:extLst>
+              </a:tr>
+            </a:tbl>
+          </a:graphicData>
+        </a:graphic>
+      </p:graphicFrame>
+      <p:sp>
+        <p:nvSpPr>
+          <p:cNvPr id="2" name="TextBox 1">
+            <a:extLst>
+              <a:ext uri="{FF2B5EF4-FFF2-40B4-BE49-F238E27FC236}">
+                <a16:creationId xmlns:a16="http://schemas.microsoft.com/office/drawing/2014/main" id="{3672D049-FA6C-4FF7-A825-423DCA6831F6}"/>
+              </a:ext>
+            </a:extLst>
+          </p:cNvPr>
+          <p:cNvSpPr txBox="1"/>
+          <p:nvPr/>
+        </p:nvSpPr>
+        <p:spPr>
+          <a:xfrm>
+            <a:off x="633046" y="140677"/>
+            <a:ext cx="8002951" cy="523220"/>
+          </a:xfrm>
+          <a:prstGeom prst="rect">
+            <a:avLst/>
+          </a:prstGeom>
+          <a:noFill/>
+        </p:spPr>
+        <p:txBody>
+          <a:bodyPr wrap="square" rtlCol="0">
+            <a:spAutoFit/>
+          </a:bodyPr>
+          <a:lstStyle/>
+          <a:p>
+            <a:r>
+              <a:rPr lang="en-US" sz="2800" dirty="0"/>
+              <a:t>STL Comparison for A2 (Stdzed,2 std dev threshold)</a:t>
+            </a:r>
+          </a:p>
+        </p:txBody>
+      </p:sp>
+    </p:spTree>
+    <p:extLst>
+      <p:ext uri="{BB962C8B-B14F-4D97-AF65-F5344CB8AC3E}">
+        <p14:creationId xmlns:p14="http://schemas.microsoft.com/office/powerpoint/2010/main" val="2378106849"/>
+      </p:ext>
+    </p:extLst>
+  </p:cSld>
+  <p:clrMapOvr>
+    <a:masterClrMapping/>
+  </p:clrMapOvr>
+</p:sld>
+</file>
+
+<file path=ppt/slides/slide3.xml><?xml version="1.0" encoding="utf-8"?>
+<p:sld xmlns:a="http://schemas.openxmlformats.org/drawingml/2006/main" xmlns:r="http://schemas.openxmlformats.org/officeDocument/2006/relationships" xmlns:p="http://schemas.openxmlformats.org/presentationml/2006/main">
+  <p:cSld>
+    <p:spTree>
+      <p:nvGrpSpPr>
+        <p:cNvPr id="1" name=""/>
+        <p:cNvGrpSpPr/>
+        <p:nvPr/>
+      </p:nvGrpSpPr>
+      <p:grpSpPr>
+        <a:xfrm>
+          <a:off x="0" y="0"/>
+          <a:ext cx="0" cy="0"/>
+          <a:chOff x="0" y="0"/>
+          <a:chExt cx="0" cy="0"/>
+        </a:xfrm>
+      </p:grpSpPr>
+      <p:graphicFrame>
+        <p:nvGraphicFramePr>
+          <p:cNvPr id="4" name="Table 4">
+            <a:extLst>
+              <a:ext uri="{FF2B5EF4-FFF2-40B4-BE49-F238E27FC236}">
+                <a16:creationId xmlns:a16="http://schemas.microsoft.com/office/drawing/2014/main" id="{7098E8ED-CAEB-4C65-A84A-B56340DD2B08}"/>
+              </a:ext>
+            </a:extLst>
+          </p:cNvPr>
+          <p:cNvGraphicFramePr>
+            <a:graphicFrameLocks noGrp="1"/>
+          </p:cNvGraphicFramePr>
+          <p:nvPr>
+            <p:extLst>
+              <p:ext uri="{D42A27DB-BD31-4B8C-83A1-F6EECF244321}">
+                <p14:modId xmlns:p14="http://schemas.microsoft.com/office/powerpoint/2010/main" val="2261079554"/>
+              </p:ext>
+            </p:extLst>
+          </p:nvPr>
+        </p:nvGraphicFramePr>
+        <p:xfrm>
+          <a:off x="1828799" y="1062892"/>
+          <a:ext cx="6807198" cy="2954215"/>
+        </p:xfrm>
+        <a:graphic>
+          <a:graphicData uri="http://schemas.openxmlformats.org/drawingml/2006/table">
+            <a:tbl>
+              <a:tblPr firstRow="1" bandRow="1">
+                <a:tableStyleId>{5C22544A-7EE6-4342-B048-85BDC9FD1C3A}</a:tableStyleId>
+              </a:tblPr>
+              <a:tblGrid>
+                <a:gridCol w="2269066">
+                  <a:extLst>
+                    <a:ext uri="{9D8B030D-6E8A-4147-A177-3AD203B41FA5}">
+                      <a16:colId xmlns:a16="http://schemas.microsoft.com/office/drawing/2014/main" val="722819149"/>
+                    </a:ext>
+                  </a:extLst>
+                </a:gridCol>
+                <a:gridCol w="2269066">
+                  <a:extLst>
+                    <a:ext uri="{9D8B030D-6E8A-4147-A177-3AD203B41FA5}">
+                      <a16:colId xmlns:a16="http://schemas.microsoft.com/office/drawing/2014/main" val="289931920"/>
+                    </a:ext>
+                  </a:extLst>
+                </a:gridCol>
+                <a:gridCol w="2269066">
+                  <a:extLst>
+                    <a:ext uri="{9D8B030D-6E8A-4147-A177-3AD203B41FA5}">
+                      <a16:colId xmlns:a16="http://schemas.microsoft.com/office/drawing/2014/main" val="379603293"/>
+                    </a:ext>
+                  </a:extLst>
+                </a:gridCol>
+              </a:tblGrid>
+              <a:tr h="590843">
+                <a:tc>
+                  <a:txBody>
+                    <a:bodyPr/>
+                    <a:lstStyle/>
+                    <a:p>
+                      <a:pPr algn="ctr"/>
+                      <a:r>
+                        <a:rPr lang="en-US" dirty="0"/>
+                        <a:t>Metric\API</a:t>
+                      </a:r>
+                    </a:p>
+                  </a:txBody>
+                  <a:tcPr/>
+                </a:tc>
+                <a:tc>
+                  <a:txBody>
+                    <a:bodyPr/>
+                    <a:lstStyle/>
+                    <a:p>
+                      <a:pPr algn="ctr"/>
+                      <a:r>
+                        <a:rPr lang="en-US" dirty="0" err="1"/>
+                        <a:t>Seasonal_decompose</a:t>
+                      </a:r>
+                      <a:endParaRPr lang="en-US" dirty="0"/>
+                    </a:p>
+                  </a:txBody>
+                  <a:tcPr/>
+                </a:tc>
+                <a:tc>
+                  <a:txBody>
+                    <a:bodyPr/>
+                    <a:lstStyle/>
+                    <a:p>
+                      <a:pPr algn="ctr"/>
+                      <a:r>
+                        <a:rPr lang="en-US" dirty="0"/>
+                        <a:t>STL</a:t>
+                      </a:r>
+                    </a:p>
+                  </a:txBody>
+                  <a:tcPr/>
+                </a:tc>
+                <a:extLst>
+                  <a:ext uri="{0D108BD9-81ED-4DB2-BD59-A6C34878D82A}">
+                    <a16:rowId xmlns:a16="http://schemas.microsoft.com/office/drawing/2014/main" val="4157411911"/>
+                  </a:ext>
+                </a:extLst>
+              </a:tr>
+              <a:tr h="590843">
+                <a:tc>
+                  <a:txBody>
+                    <a:bodyPr/>
+                    <a:lstStyle/>
+                    <a:p>
+                      <a:pPr algn="ctr"/>
+                      <a:r>
+                        <a:rPr lang="en-US" dirty="0"/>
+                        <a:t>Precision</a:t>
+                      </a:r>
+                    </a:p>
+                  </a:txBody>
+                  <a:tcPr/>
+                </a:tc>
+                <a:tc>
+                  <a:txBody>
+                    <a:bodyPr/>
+                    <a:lstStyle/>
+                    <a:p>
+                      <a:pPr algn="ctr"/>
+                      <a:r>
+                        <a:rPr lang="en-US" dirty="0"/>
+                        <a:t>0.6252</a:t>
+                      </a:r>
+                    </a:p>
+                  </a:txBody>
+                  <a:tcPr/>
+                </a:tc>
+                <a:tc>
+                  <a:txBody>
+                    <a:bodyPr/>
+                    <a:lstStyle/>
+                    <a:p>
+                      <a:pPr algn="ctr"/>
+                      <a:endParaRPr lang="en-US"/>
+                    </a:p>
+                  </a:txBody>
+                  <a:tcPr/>
+                </a:tc>
+                <a:extLst>
+                  <a:ext uri="{0D108BD9-81ED-4DB2-BD59-A6C34878D82A}">
+                    <a16:rowId xmlns:a16="http://schemas.microsoft.com/office/drawing/2014/main" val="363083633"/>
+                  </a:ext>
+                </a:extLst>
+              </a:tr>
+              <a:tr h="590843">
+                <a:tc>
+                  <a:txBody>
+                    <a:bodyPr/>
+                    <a:lstStyle/>
+                    <a:p>
+                      <a:pPr algn="ctr"/>
+                      <a:r>
+                        <a:rPr lang="en-US" dirty="0"/>
+                        <a:t>Recall</a:t>
+                      </a:r>
+                    </a:p>
+                  </a:txBody>
+                  <a:tcPr/>
+                </a:tc>
+                <a:tc>
+                  <a:txBody>
+                    <a:bodyPr/>
+                    <a:lstStyle/>
+                    <a:p>
+                      <a:pPr algn="ctr"/>
+                      <a:r>
+                        <a:rPr lang="en-US" dirty="0"/>
+                        <a:t>0.4939</a:t>
+                      </a:r>
+                    </a:p>
+                  </a:txBody>
+                  <a:tcPr/>
+                </a:tc>
+                <a:tc>
+                  <a:txBody>
+                    <a:bodyPr/>
+                    <a:lstStyle/>
+                    <a:p>
+                      <a:pPr algn="ctr"/>
+                      <a:endParaRPr lang="en-US"/>
+                    </a:p>
+                  </a:txBody>
+                  <a:tcPr/>
+                </a:tc>
+                <a:extLst>
+                  <a:ext uri="{0D108BD9-81ED-4DB2-BD59-A6C34878D82A}">
+                    <a16:rowId xmlns:a16="http://schemas.microsoft.com/office/drawing/2014/main" val="2316127732"/>
+                  </a:ext>
+                </a:extLst>
+              </a:tr>
+              <a:tr h="590843">
+                <a:tc>
+                  <a:txBody>
+                    <a:bodyPr/>
+                    <a:lstStyle/>
+                    <a:p>
+                      <a:pPr algn="ctr"/>
+                      <a:r>
+                        <a:rPr lang="en-US" dirty="0"/>
+                        <a:t>F1 Score</a:t>
+                      </a:r>
+                    </a:p>
+                  </a:txBody>
+                  <a:tcPr/>
+                </a:tc>
+                <a:tc>
+                  <a:txBody>
+                    <a:bodyPr/>
+                    <a:lstStyle/>
+                    <a:p>
+                      <a:pPr algn="ctr"/>
+                      <a:r>
+                        <a:rPr lang="en-US" dirty="0"/>
+                        <a:t>0.4925</a:t>
+                      </a:r>
+                    </a:p>
+                  </a:txBody>
+                  <a:tcPr/>
+                </a:tc>
+                <a:tc>
+                  <a:txBody>
+                    <a:bodyPr/>
+                    <a:lstStyle/>
+                    <a:p>
+                      <a:pPr algn="ctr"/>
+                      <a:endParaRPr lang="en-US" dirty="0"/>
+                    </a:p>
+                  </a:txBody>
+                  <a:tcPr/>
+                </a:tc>
+                <a:extLst>
+                  <a:ext uri="{0D108BD9-81ED-4DB2-BD59-A6C34878D82A}">
+                    <a16:rowId xmlns:a16="http://schemas.microsoft.com/office/drawing/2014/main" val="2249889954"/>
+                  </a:ext>
+                </a:extLst>
+              </a:tr>
+              <a:tr h="590843">
+                <a:tc>
+                  <a:txBody>
+                    <a:bodyPr/>
+                    <a:lstStyle/>
+                    <a:p>
+                      <a:pPr algn="ctr"/>
+                      <a:r>
+                        <a:rPr lang="en-US" dirty="0"/>
+                        <a:t>Runtime</a:t>
+                      </a:r>
+                    </a:p>
+                  </a:txBody>
+                  <a:tcPr/>
+                </a:tc>
+                <a:tc>
+                  <a:txBody>
+                    <a:bodyPr/>
+                    <a:lstStyle/>
+                    <a:p>
+                      <a:pPr algn="ctr"/>
+                      <a:r>
+                        <a:rPr lang="en-US" dirty="0"/>
+                        <a:t>1m:28s</a:t>
+                      </a:r>
+                    </a:p>
+                  </a:txBody>
+                  <a:tcPr/>
+                </a:tc>
+                <a:tc>
+                  <a:txBody>
+                    <a:bodyPr/>
+                    <a:lstStyle/>
+                    <a:p>
+                      <a:pPr algn="ctr"/>
+                      <a:endParaRPr lang="en-US" dirty="0"/>
+                    </a:p>
+                  </a:txBody>
+                  <a:tcPr/>
+                </a:tc>
+                <a:extLst>
+                  <a:ext uri="{0D108BD9-81ED-4DB2-BD59-A6C34878D82A}">
+                    <a16:rowId xmlns:a16="http://schemas.microsoft.com/office/drawing/2014/main" val="14402245"/>
+                  </a:ext>
+                </a:extLst>
+              </a:tr>
+            </a:tbl>
+          </a:graphicData>
+        </a:graphic>
+      </p:graphicFrame>
+      <p:sp>
+        <p:nvSpPr>
+          <p:cNvPr id="2" name="TextBox 1">
+            <a:extLst>
+              <a:ext uri="{FF2B5EF4-FFF2-40B4-BE49-F238E27FC236}">
+                <a16:creationId xmlns:a16="http://schemas.microsoft.com/office/drawing/2014/main" id="{0CE0530C-C5BA-4C2F-BA50-0E3A7B32CF99}"/>
+              </a:ext>
+            </a:extLst>
+          </p:cNvPr>
+          <p:cNvSpPr txBox="1"/>
+          <p:nvPr/>
+        </p:nvSpPr>
+        <p:spPr>
+          <a:xfrm>
+            <a:off x="1008185" y="140677"/>
+            <a:ext cx="7627812" cy="523220"/>
+          </a:xfrm>
+          <a:prstGeom prst="rect">
+            <a:avLst/>
+          </a:prstGeom>
+          <a:noFill/>
+        </p:spPr>
+        <p:txBody>
+          <a:bodyPr wrap="square" rtlCol="0">
+            <a:spAutoFit/>
+          </a:bodyPr>
+          <a:lstStyle/>
+          <a:p>
+            <a:r>
+              <a:rPr lang="en-US" sz="2800" dirty="0"/>
+              <a:t>STL Comparison for A3 (Stdzed,2 std dev threshold)</a:t>
+            </a:r>
+          </a:p>
+        </p:txBody>
+      </p:sp>
+    </p:spTree>
+    <p:extLst>
+      <p:ext uri="{BB962C8B-B14F-4D97-AF65-F5344CB8AC3E}">
+        <p14:creationId xmlns:p14="http://schemas.microsoft.com/office/powerpoint/2010/main" val="1209605998"/>
+      </p:ext>
+    </p:extLst>
+  </p:cSld>
+  <p:clrMapOvr>
+    <a:masterClrMapping/>
+  </p:clrMapOvr>
+</p:sld>
+</file>
+
+<file path=ppt/slides/slide4.xml><?xml version="1.0" encoding="utf-8"?>
+<p:sld xmlns:a="http://schemas.openxmlformats.org/drawingml/2006/main" xmlns:r="http://schemas.openxmlformats.org/officeDocument/2006/relationships" xmlns:p="http://schemas.openxmlformats.org/presentationml/2006/main">
+  <p:cSld>
+    <p:spTree>
+      <p:nvGrpSpPr>
+        <p:cNvPr id="1" name=""/>
+        <p:cNvGrpSpPr/>
+        <p:nvPr/>
+      </p:nvGrpSpPr>
+      <p:grpSpPr>
+        <a:xfrm>
+          <a:off x="0" y="0"/>
+          <a:ext cx="0" cy="0"/>
+          <a:chOff x="0" y="0"/>
+          <a:chExt cx="0" cy="0"/>
+        </a:xfrm>
+      </p:grpSpPr>
+      <p:graphicFrame>
+        <p:nvGraphicFramePr>
+          <p:cNvPr id="4" name="Table 4">
+            <a:extLst>
+              <a:ext uri="{FF2B5EF4-FFF2-40B4-BE49-F238E27FC236}">
+                <a16:creationId xmlns:a16="http://schemas.microsoft.com/office/drawing/2014/main" id="{7098E8ED-CAEB-4C65-A84A-B56340DD2B08}"/>
+              </a:ext>
+            </a:extLst>
+          </p:cNvPr>
+          <p:cNvGraphicFramePr>
+            <a:graphicFrameLocks noGrp="1"/>
+          </p:cNvGraphicFramePr>
+          <p:nvPr>
+            <p:extLst>
+              <p:ext uri="{D42A27DB-BD31-4B8C-83A1-F6EECF244321}">
+                <p14:modId xmlns:p14="http://schemas.microsoft.com/office/powerpoint/2010/main" val="3744019025"/>
+              </p:ext>
+            </p:extLst>
+          </p:nvPr>
+        </p:nvGraphicFramePr>
+        <p:xfrm>
+          <a:off x="1828799" y="1062892"/>
+          <a:ext cx="6807198" cy="2954215"/>
+        </p:xfrm>
+        <a:graphic>
+          <a:graphicData uri="http://schemas.openxmlformats.org/drawingml/2006/table">
+            <a:tbl>
+              <a:tblPr firstRow="1" bandRow="1">
+                <a:tableStyleId>{5C22544A-7EE6-4342-B048-85BDC9FD1C3A}</a:tableStyleId>
+              </a:tblPr>
+              <a:tblGrid>
+                <a:gridCol w="2269066">
+                  <a:extLst>
+                    <a:ext uri="{9D8B030D-6E8A-4147-A177-3AD203B41FA5}">
+                      <a16:colId xmlns:a16="http://schemas.microsoft.com/office/drawing/2014/main" val="722819149"/>
+                    </a:ext>
+                  </a:extLst>
+                </a:gridCol>
+                <a:gridCol w="2269066">
+                  <a:extLst>
+                    <a:ext uri="{9D8B030D-6E8A-4147-A177-3AD203B41FA5}">
+                      <a16:colId xmlns:a16="http://schemas.microsoft.com/office/drawing/2014/main" val="289931920"/>
+                    </a:ext>
+                  </a:extLst>
+                </a:gridCol>
+                <a:gridCol w="2269066">
+                  <a:extLst>
+                    <a:ext uri="{9D8B030D-6E8A-4147-A177-3AD203B41FA5}">
+                      <a16:colId xmlns:a16="http://schemas.microsoft.com/office/drawing/2014/main" val="379603293"/>
+                    </a:ext>
+                  </a:extLst>
+                </a:gridCol>
+              </a:tblGrid>
+              <a:tr h="590843">
+                <a:tc>
+                  <a:txBody>
+                    <a:bodyPr/>
+                    <a:lstStyle/>
+                    <a:p>
+                      <a:pPr algn="ctr"/>
+                      <a:r>
+                        <a:rPr lang="en-US" dirty="0"/>
+                        <a:t>Metric\API</a:t>
+                      </a:r>
+                    </a:p>
+                  </a:txBody>
+                  <a:tcPr/>
+                </a:tc>
+                <a:tc>
+                  <a:txBody>
+                    <a:bodyPr/>
+                    <a:lstStyle/>
+                    <a:p>
+                      <a:pPr algn="ctr"/>
+                      <a:r>
+                        <a:rPr lang="en-US" dirty="0" err="1"/>
+                        <a:t>Seasonal_decompose</a:t>
+                      </a:r>
+                      <a:endParaRPr lang="en-US" dirty="0"/>
+                    </a:p>
+                  </a:txBody>
+                  <a:tcPr/>
+                </a:tc>
+                <a:tc>
+                  <a:txBody>
+                    <a:bodyPr/>
+                    <a:lstStyle/>
+                    <a:p>
+                      <a:pPr algn="ctr"/>
+                      <a:r>
+                        <a:rPr lang="en-US" dirty="0"/>
+                        <a:t>STL</a:t>
+                      </a:r>
+                    </a:p>
+                  </a:txBody>
+                  <a:tcPr/>
+                </a:tc>
+                <a:extLst>
+                  <a:ext uri="{0D108BD9-81ED-4DB2-BD59-A6C34878D82A}">
+                    <a16:rowId xmlns:a16="http://schemas.microsoft.com/office/drawing/2014/main" val="4157411911"/>
+                  </a:ext>
+                </a:extLst>
+              </a:tr>
+              <a:tr h="590843">
+                <a:tc>
+                  <a:txBody>
+                    <a:bodyPr/>
+                    <a:lstStyle/>
+                    <a:p>
+                      <a:pPr algn="ctr"/>
+                      <a:r>
+                        <a:rPr lang="en-US" dirty="0"/>
+                        <a:t>Precision</a:t>
+                      </a:r>
+                    </a:p>
+                  </a:txBody>
+                  <a:tcPr/>
+                </a:tc>
+                <a:tc>
+                  <a:txBody>
+                    <a:bodyPr/>
+                    <a:lstStyle/>
+                    <a:p>
+                      <a:pPr algn="ctr"/>
+                      <a:r>
+                        <a:rPr lang="en-US" dirty="0"/>
+                        <a:t>0.4821</a:t>
+                      </a:r>
+                    </a:p>
+                  </a:txBody>
+                  <a:tcPr/>
+                </a:tc>
+                <a:tc>
+                  <a:txBody>
+                    <a:bodyPr/>
+                    <a:lstStyle/>
+                    <a:p>
+                      <a:pPr algn="ctr"/>
+                      <a:endParaRPr lang="en-US"/>
+                    </a:p>
+                  </a:txBody>
+                  <a:tcPr/>
+                </a:tc>
+                <a:extLst>
+                  <a:ext uri="{0D108BD9-81ED-4DB2-BD59-A6C34878D82A}">
+                    <a16:rowId xmlns:a16="http://schemas.microsoft.com/office/drawing/2014/main" val="363083633"/>
+                  </a:ext>
+                </a:extLst>
+              </a:tr>
+              <a:tr h="590843">
+                <a:tc>
+                  <a:txBody>
+                    <a:bodyPr/>
+                    <a:lstStyle/>
+                    <a:p>
+                      <a:pPr algn="ctr"/>
+                      <a:r>
+                        <a:rPr lang="en-US" dirty="0"/>
+                        <a:t>Recall</a:t>
+                      </a:r>
+                    </a:p>
+                  </a:txBody>
+                  <a:tcPr/>
+                </a:tc>
+                <a:tc>
+                  <a:txBody>
+                    <a:bodyPr/>
+                    <a:lstStyle/>
+                    <a:p>
+                      <a:pPr algn="ctr"/>
+                      <a:r>
+                        <a:rPr lang="en-US" dirty="0"/>
+                        <a:t>0.8379</a:t>
+                      </a:r>
+                    </a:p>
+                  </a:txBody>
+                  <a:tcPr/>
+                </a:tc>
+                <a:tc>
+                  <a:txBody>
+                    <a:bodyPr/>
+                    <a:lstStyle/>
+                    <a:p>
+                      <a:pPr algn="ctr"/>
+                      <a:endParaRPr lang="en-US"/>
+                    </a:p>
+                  </a:txBody>
+                  <a:tcPr/>
+                </a:tc>
+                <a:extLst>
+                  <a:ext uri="{0D108BD9-81ED-4DB2-BD59-A6C34878D82A}">
+                    <a16:rowId xmlns:a16="http://schemas.microsoft.com/office/drawing/2014/main" val="2316127732"/>
+                  </a:ext>
+                </a:extLst>
+              </a:tr>
+              <a:tr h="590843">
+                <a:tc>
+                  <a:txBody>
+                    <a:bodyPr/>
+                    <a:lstStyle/>
+                    <a:p>
+                      <a:pPr algn="ctr"/>
+                      <a:r>
+                        <a:rPr lang="en-US" dirty="0"/>
+                        <a:t>F1 Score</a:t>
+                      </a:r>
+                    </a:p>
+                  </a:txBody>
+                  <a:tcPr/>
+                </a:tc>
+                <a:tc>
+                  <a:txBody>
+                    <a:bodyPr/>
+                    <a:lstStyle/>
+                    <a:p>
+                      <a:pPr algn="ctr"/>
+                      <a:r>
+                        <a:rPr lang="en-US" dirty="0"/>
+                        <a:t>0.5354</a:t>
+                      </a:r>
+                    </a:p>
+                  </a:txBody>
+                  <a:tcPr/>
+                </a:tc>
+                <a:tc>
+                  <a:txBody>
+                    <a:bodyPr/>
+                    <a:lstStyle/>
+                    <a:p>
+                      <a:pPr algn="ctr"/>
+                      <a:endParaRPr lang="en-US" dirty="0"/>
+                    </a:p>
+                  </a:txBody>
+                  <a:tcPr/>
+                </a:tc>
+                <a:extLst>
+                  <a:ext uri="{0D108BD9-81ED-4DB2-BD59-A6C34878D82A}">
+                    <a16:rowId xmlns:a16="http://schemas.microsoft.com/office/drawing/2014/main" val="2249889954"/>
+                  </a:ext>
+                </a:extLst>
+              </a:tr>
+              <a:tr h="590843">
+                <a:tc>
+                  <a:txBody>
+                    <a:bodyPr/>
+                    <a:lstStyle/>
+                    <a:p>
+                      <a:pPr algn="ctr"/>
+                      <a:r>
+                        <a:rPr lang="en-US" dirty="0"/>
+                        <a:t>Runtime</a:t>
+                      </a:r>
+                    </a:p>
+                  </a:txBody>
+                  <a:tcPr/>
+                </a:tc>
+                <a:tc>
+                  <a:txBody>
+                    <a:bodyPr/>
+                    <a:lstStyle/>
+                    <a:p>
+                      <a:pPr algn="ctr"/>
+                      <a:r>
+                        <a:rPr lang="en-US" dirty="0"/>
+                        <a:t>1m:20s</a:t>
+                      </a:r>
+                    </a:p>
+                  </a:txBody>
+                  <a:tcPr/>
+                </a:tc>
+                <a:tc>
+                  <a:txBody>
+                    <a:bodyPr/>
+                    <a:lstStyle/>
+                    <a:p>
+                      <a:pPr algn="ctr"/>
+                      <a:endParaRPr lang="en-US" dirty="0"/>
+                    </a:p>
+                  </a:txBody>
+                  <a:tcPr/>
+                </a:tc>
+                <a:extLst>
+                  <a:ext uri="{0D108BD9-81ED-4DB2-BD59-A6C34878D82A}">
+                    <a16:rowId xmlns:a16="http://schemas.microsoft.com/office/drawing/2014/main" val="14402245"/>
+                  </a:ext>
+                </a:extLst>
+              </a:tr>
+            </a:tbl>
+          </a:graphicData>
+        </a:graphic>
+      </p:graphicFrame>
+      <p:sp>
+        <p:nvSpPr>
+          <p:cNvPr id="6" name="TextBox 5">
+            <a:extLst>
+              <a:ext uri="{FF2B5EF4-FFF2-40B4-BE49-F238E27FC236}">
+                <a16:creationId xmlns:a16="http://schemas.microsoft.com/office/drawing/2014/main" id="{67203080-D80D-4342-BD87-9E9A8409BCFC}"/>
+              </a:ext>
+            </a:extLst>
+          </p:cNvPr>
+          <p:cNvSpPr txBox="1"/>
+          <p:nvPr/>
+        </p:nvSpPr>
+        <p:spPr>
+          <a:xfrm>
+            <a:off x="1008185" y="140677"/>
+            <a:ext cx="7627812" cy="523220"/>
+          </a:xfrm>
+          <a:prstGeom prst="rect">
+            <a:avLst/>
+          </a:prstGeom>
+          <a:noFill/>
+        </p:spPr>
+        <p:txBody>
+          <a:bodyPr wrap="square" rtlCol="0">
+            <a:spAutoFit/>
+          </a:bodyPr>
+          <a:lstStyle/>
+          <a:p>
+            <a:r>
+              <a:rPr lang="en-US" sz="2800" dirty="0"/>
+              <a:t>STL Comparison for A4 (Stdzed,2 std dev threshold)</a:t>
+            </a:r>
+          </a:p>
+        </p:txBody>
+      </p:sp>
+    </p:spTree>
+    <p:extLst>
+      <p:ext uri="{BB962C8B-B14F-4D97-AF65-F5344CB8AC3E}">
+        <p14:creationId xmlns:p14="http://schemas.microsoft.com/office/powerpoint/2010/main" val="2110166103"/>
+      </p:ext>
+    </p:extLst>
+  </p:cSld>
+  <p:clrMapOvr>
+    <a:masterClrMapping/>
+  </p:clrMapOvr>
+</p:sld>
+</file>
+
+<file path=ppt/slides/slide5.xml><?xml version="1.0" encoding="utf-8"?>
+<p:sld xmlns:a="http://schemas.openxmlformats.org/drawingml/2006/main" xmlns:r="http://schemas.openxmlformats.org/officeDocument/2006/relationships" xmlns:p="http://schemas.openxmlformats.org/presentationml/2006/main">
+  <p:cSld>
+    <p:spTree>
+      <p:nvGrpSpPr>
+        <p:cNvPr id="1" name=""/>
+        <p:cNvGrpSpPr/>
+        <p:nvPr/>
+      </p:nvGrpSpPr>
+      <p:grpSpPr>
+        <a:xfrm>
+          <a:off x="0" y="0"/>
+          <a:ext cx="0" cy="0"/>
+          <a:chOff x="0" y="0"/>
+          <a:chExt cx="0" cy="0"/>
+        </a:xfrm>
+      </p:grpSpPr>
+      <p:graphicFrame>
+        <p:nvGraphicFramePr>
+          <p:cNvPr id="4" name="Table 4">
+            <a:extLst>
+              <a:ext uri="{FF2B5EF4-FFF2-40B4-BE49-F238E27FC236}">
+                <a16:creationId xmlns:a16="http://schemas.microsoft.com/office/drawing/2014/main" id="{7098E8ED-CAEB-4C65-A84A-B56340DD2B08}"/>
+              </a:ext>
+            </a:extLst>
+          </p:cNvPr>
+          <p:cNvGraphicFramePr>
+            <a:graphicFrameLocks noGrp="1"/>
+          </p:cNvGraphicFramePr>
+          <p:nvPr>
+            <p:extLst>
+              <p:ext uri="{D42A27DB-BD31-4B8C-83A1-F6EECF244321}">
+                <p14:modId xmlns:p14="http://schemas.microsoft.com/office/powerpoint/2010/main" val="547041478"/>
+              </p:ext>
+            </p:extLst>
+          </p:nvPr>
+        </p:nvGraphicFramePr>
+        <p:xfrm>
+          <a:off x="1828799" y="1062892"/>
+          <a:ext cx="6807198" cy="2954215"/>
+        </p:xfrm>
+        <a:graphic>
+          <a:graphicData uri="http://schemas.openxmlformats.org/drawingml/2006/table">
+            <a:tbl>
+              <a:tblPr firstRow="1" bandRow="1">
+                <a:tableStyleId>{5C22544A-7EE6-4342-B048-85BDC9FD1C3A}</a:tableStyleId>
+              </a:tblPr>
+              <a:tblGrid>
+                <a:gridCol w="2269066">
+                  <a:extLst>
+                    <a:ext uri="{9D8B030D-6E8A-4147-A177-3AD203B41FA5}">
+                      <a16:colId xmlns:a16="http://schemas.microsoft.com/office/drawing/2014/main" val="722819149"/>
+                    </a:ext>
+                  </a:extLst>
+                </a:gridCol>
+                <a:gridCol w="2269066">
+                  <a:extLst>
+                    <a:ext uri="{9D8B030D-6E8A-4147-A177-3AD203B41FA5}">
+                      <a16:colId xmlns:a16="http://schemas.microsoft.com/office/drawing/2014/main" val="289931920"/>
+                    </a:ext>
+                  </a:extLst>
+                </a:gridCol>
+                <a:gridCol w="2269066">
+                  <a:extLst>
+                    <a:ext uri="{9D8B030D-6E8A-4147-A177-3AD203B41FA5}">
+                      <a16:colId xmlns:a16="http://schemas.microsoft.com/office/drawing/2014/main" val="379603293"/>
+                    </a:ext>
+                  </a:extLst>
+                </a:gridCol>
+              </a:tblGrid>
+              <a:tr h="590843">
+                <a:tc>
+                  <a:txBody>
+                    <a:bodyPr/>
+                    <a:lstStyle/>
+                    <a:p>
+                      <a:pPr algn="ctr"/>
+                      <a:r>
+                        <a:rPr lang="en-US" dirty="0"/>
+                        <a:t>Metric\API</a:t>
+                      </a:r>
+                    </a:p>
+                  </a:txBody>
+                  <a:tcPr/>
+                </a:tc>
+                <a:tc>
+                  <a:txBody>
+                    <a:bodyPr/>
+                    <a:lstStyle/>
+                    <a:p>
+                      <a:pPr algn="ctr"/>
+                      <a:r>
+                        <a:rPr lang="en-US" dirty="0" err="1"/>
+                        <a:t>Seasonal_decompose</a:t>
+                      </a:r>
+                      <a:endParaRPr lang="en-US" dirty="0"/>
+                    </a:p>
+                  </a:txBody>
+                  <a:tcPr/>
+                </a:tc>
+                <a:tc>
+                  <a:txBody>
+                    <a:bodyPr/>
+                    <a:lstStyle/>
+                    <a:p>
+                      <a:pPr algn="ctr"/>
+                      <a:r>
+                        <a:rPr lang="en-US" dirty="0"/>
+                        <a:t>STL</a:t>
+                      </a:r>
+                    </a:p>
+                  </a:txBody>
+                  <a:tcPr/>
+                </a:tc>
+                <a:extLst>
+                  <a:ext uri="{0D108BD9-81ED-4DB2-BD59-A6C34878D82A}">
+                    <a16:rowId xmlns:a16="http://schemas.microsoft.com/office/drawing/2014/main" val="4157411911"/>
+                  </a:ext>
+                </a:extLst>
+              </a:tr>
+              <a:tr h="590843">
+                <a:tc>
+                  <a:txBody>
+                    <a:bodyPr/>
+                    <a:lstStyle/>
+                    <a:p>
+                      <a:pPr algn="ctr"/>
+                      <a:r>
+                        <a:rPr lang="en-US" dirty="0"/>
+                        <a:t>Precision</a:t>
+                      </a:r>
+                    </a:p>
+                  </a:txBody>
+                  <a:tcPr/>
+                </a:tc>
+                <a:tc>
+                  <a:txBody>
+                    <a:bodyPr/>
+                    <a:lstStyle/>
+                    <a:p>
+                      <a:pPr algn="ctr"/>
+                      <a:endParaRPr lang="en-US" dirty="0"/>
+                    </a:p>
+                  </a:txBody>
+                  <a:tcPr/>
+                </a:tc>
+                <a:tc>
+                  <a:txBody>
+                    <a:bodyPr/>
+                    <a:lstStyle/>
+                    <a:p>
+                      <a:pPr algn="ctr"/>
+                      <a:endParaRPr lang="en-US"/>
+                    </a:p>
+                  </a:txBody>
+                  <a:tcPr/>
+                </a:tc>
+                <a:extLst>
+                  <a:ext uri="{0D108BD9-81ED-4DB2-BD59-A6C34878D82A}">
+                    <a16:rowId xmlns:a16="http://schemas.microsoft.com/office/drawing/2014/main" val="363083633"/>
+                  </a:ext>
+                </a:extLst>
+              </a:tr>
+              <a:tr h="590843">
+                <a:tc>
+                  <a:txBody>
+                    <a:bodyPr/>
+                    <a:lstStyle/>
+                    <a:p>
+                      <a:pPr algn="ctr"/>
+                      <a:r>
+                        <a:rPr lang="en-US" dirty="0"/>
+                        <a:t>Recall</a:t>
+                      </a:r>
+                    </a:p>
+                  </a:txBody>
+                  <a:tcPr/>
+                </a:tc>
+                <a:tc>
+                  <a:txBody>
+                    <a:bodyPr/>
+                    <a:lstStyle/>
+                    <a:p>
+                      <a:pPr algn="ctr"/>
+                      <a:endParaRPr lang="en-US"/>
+                    </a:p>
+                  </a:txBody>
+                  <a:tcPr/>
+                </a:tc>
+                <a:tc>
+                  <a:txBody>
+                    <a:bodyPr/>
+                    <a:lstStyle/>
+                    <a:p>
+                      <a:pPr algn="ctr"/>
+                      <a:endParaRPr lang="en-US"/>
+                    </a:p>
+                  </a:txBody>
+                  <a:tcPr/>
+                </a:tc>
+                <a:extLst>
+                  <a:ext uri="{0D108BD9-81ED-4DB2-BD59-A6C34878D82A}">
+                    <a16:rowId xmlns:a16="http://schemas.microsoft.com/office/drawing/2014/main" val="2316127732"/>
+                  </a:ext>
+                </a:extLst>
+              </a:tr>
+              <a:tr h="590843">
+                <a:tc>
+                  <a:txBody>
+                    <a:bodyPr/>
+                    <a:lstStyle/>
+                    <a:p>
+                      <a:pPr algn="ctr"/>
+                      <a:r>
+                        <a:rPr lang="en-US" dirty="0"/>
+                        <a:t>F1 Score</a:t>
+                      </a:r>
+                    </a:p>
+                  </a:txBody>
+                  <a:tcPr/>
+                </a:tc>
+                <a:tc>
+                  <a:txBody>
+                    <a:bodyPr/>
+                    <a:lstStyle/>
+                    <a:p>
+                      <a:pPr algn="ctr"/>
+                      <a:endParaRPr lang="en-US"/>
+                    </a:p>
+                  </a:txBody>
+                  <a:tcPr/>
+                </a:tc>
+                <a:tc>
+                  <a:txBody>
+                    <a:bodyPr/>
+                    <a:lstStyle/>
+                    <a:p>
+                      <a:pPr algn="ctr"/>
+                      <a:endParaRPr lang="en-US" dirty="0"/>
+                    </a:p>
+                  </a:txBody>
+                  <a:tcPr/>
+                </a:tc>
+                <a:extLst>
+                  <a:ext uri="{0D108BD9-81ED-4DB2-BD59-A6C34878D82A}">
+                    <a16:rowId xmlns:a16="http://schemas.microsoft.com/office/drawing/2014/main" val="2249889954"/>
+                  </a:ext>
+                </a:extLst>
+              </a:tr>
+              <a:tr h="590843">
+                <a:tc>
+                  <a:txBody>
+                    <a:bodyPr/>
+                    <a:lstStyle/>
+                    <a:p>
+                      <a:pPr algn="ctr"/>
+                      <a:r>
+                        <a:rPr lang="en-US" dirty="0"/>
+                        <a:t>Runtime</a:t>
+                      </a:r>
+                    </a:p>
+                  </a:txBody>
+                  <a:tcPr/>
+                </a:tc>
+                <a:tc>
+                  <a:txBody>
+                    <a:bodyPr/>
+                    <a:lstStyle/>
+                    <a:p>
+                      <a:pPr algn="ctr"/>
+                      <a:endParaRPr lang="en-US"/>
+                    </a:p>
+                  </a:txBody>
+                  <a:tcPr/>
+                </a:tc>
+                <a:tc>
+                  <a:txBody>
+                    <a:bodyPr/>
+                    <a:lstStyle/>
+                    <a:p>
+                      <a:pPr algn="ctr"/>
+                      <a:endParaRPr lang="en-US" dirty="0"/>
+                    </a:p>
+                  </a:txBody>
+                  <a:tcPr/>
+                </a:tc>
+                <a:extLst>
+                  <a:ext uri="{0D108BD9-81ED-4DB2-BD59-A6C34878D82A}">
+                    <a16:rowId xmlns:a16="http://schemas.microsoft.com/office/drawing/2014/main" val="14402245"/>
+                  </a:ext>
+                </a:extLst>
+              </a:tr>
+            </a:tbl>
+          </a:graphicData>
+        </a:graphic>
+      </p:graphicFrame>
+      <p:sp>
+        <p:nvSpPr>
+          <p:cNvPr id="6" name="TextBox 5">
+            <a:extLst>
+              <a:ext uri="{FF2B5EF4-FFF2-40B4-BE49-F238E27FC236}">
+                <a16:creationId xmlns:a16="http://schemas.microsoft.com/office/drawing/2014/main" id="{9C2F50DE-7537-4510-ACA0-AAF779F281A0}"/>
+              </a:ext>
+            </a:extLst>
+          </p:cNvPr>
+          <p:cNvSpPr txBox="1"/>
+          <p:nvPr/>
+        </p:nvSpPr>
+        <p:spPr>
+          <a:xfrm>
+            <a:off x="1609969" y="140677"/>
+            <a:ext cx="7026028" cy="523220"/>
+          </a:xfrm>
+          <a:prstGeom prst="rect">
+            <a:avLst/>
+          </a:prstGeom>
+          <a:noFill/>
+        </p:spPr>
+        <p:txBody>
+          <a:bodyPr wrap="square" rtlCol="0">
+            <a:spAutoFit/>
+          </a:bodyPr>
+          <a:lstStyle/>
+          <a:p>
+            <a:r>
+              <a:rPr lang="en-US" sz="2800" dirty="0"/>
+              <a:t>STL Comparison for A1</a:t>
+            </a:r>
+          </a:p>
+        </p:txBody>
+      </p:sp>
+    </p:spTree>
+    <p:extLst>
+      <p:ext uri="{BB962C8B-B14F-4D97-AF65-F5344CB8AC3E}">
+        <p14:creationId xmlns:p14="http://schemas.microsoft.com/office/powerpoint/2010/main" val="1104151266"/>
+      </p:ext>
+    </p:extLst>
+  </p:cSld>
+  <p:clrMapOvr>
+    <a:masterClrMapping/>
+  </p:clrMapOvr>
+</p:sld>
+</file>
+
+<file path=ppt/slides/slide6.xml><?xml version="1.0" encoding="utf-8"?>
+<p:sld xmlns:a="http://schemas.openxmlformats.org/drawingml/2006/main" xmlns:r="http://schemas.openxmlformats.org/officeDocument/2006/relationships" xmlns:p="http://schemas.openxmlformats.org/presentationml/2006/main">
+  <p:cSld>
+    <p:spTree>
+      <p:nvGrpSpPr>
+        <p:cNvPr id="1" name=""/>
+        <p:cNvGrpSpPr/>
+        <p:nvPr/>
+      </p:nvGrpSpPr>
+      <p:grpSpPr>
+        <a:xfrm>
+          <a:off x="0" y="0"/>
+          <a:ext cx="0" cy="0"/>
+          <a:chOff x="0" y="0"/>
+          <a:chExt cx="0" cy="0"/>
+        </a:xfrm>
+      </p:grpSpPr>
       <p:sp>
         <p:nvSpPr>
           <p:cNvPr id="2" name="Title 1">
@@ -6647,7 +8075,7 @@
 </p:sld>
 </file>
 
-<file path=ppt/slides/slide3.xml><?xml version="1.0" encoding="utf-8"?>
+<file path=ppt/slides/slide7.xml><?xml version="1.0" encoding="utf-8"?>
 <p:sld xmlns:a="http://schemas.openxmlformats.org/drawingml/2006/main" xmlns:r="http://schemas.openxmlformats.org/officeDocument/2006/relationships" xmlns:p="http://schemas.openxmlformats.org/presentationml/2006/main">
   <p:cSld name="page2">
     <p:spTree>
@@ -6849,7 +8277,7 @@
 </p:sld>
 </file>
 
-<file path=ppt/slides/slide4.xml><?xml version="1.0" encoding="utf-8"?>
+<file path=ppt/slides/slide8.xml><?xml version="1.0" encoding="utf-8"?>
 <p:sld xmlns:a="http://schemas.openxmlformats.org/drawingml/2006/main" xmlns:r="http://schemas.openxmlformats.org/officeDocument/2006/relationships" xmlns:p="http://schemas.openxmlformats.org/presentationml/2006/main">
   <p:cSld>
     <p:spTree>

</xml_diff>

<commit_message>
Added slides for A3 and A4 comparisons
</commit_message>
<xml_diff>
--- a/papers/ComparisonSlide11Oct.pptx
+++ b/papers/ComparisonSlide11Oct.pptx
@@ -5,20 +5,21 @@
     <p:sldMasterId id="2147483648" r:id="rId1"/>
   </p:sldMasterIdLst>
   <p:notesMasterIdLst>
-    <p:notesMasterId r:id="rId10"/>
+    <p:notesMasterId r:id="rId11"/>
   </p:notesMasterIdLst>
   <p:handoutMasterIdLst>
-    <p:handoutMasterId r:id="rId11"/>
+    <p:handoutMasterId r:id="rId12"/>
   </p:handoutMasterIdLst>
   <p:sldIdLst>
     <p:sldId id="256" r:id="rId2"/>
-    <p:sldId id="263" r:id="rId3"/>
-    <p:sldId id="264" r:id="rId4"/>
-    <p:sldId id="265" r:id="rId5"/>
-    <p:sldId id="261" r:id="rId6"/>
-    <p:sldId id="259" r:id="rId7"/>
-    <p:sldId id="257" r:id="rId8"/>
-    <p:sldId id="258" r:id="rId9"/>
+    <p:sldId id="266" r:id="rId3"/>
+    <p:sldId id="268" r:id="rId4"/>
+    <p:sldId id="263" r:id="rId5"/>
+    <p:sldId id="264" r:id="rId6"/>
+    <p:sldId id="265" r:id="rId7"/>
+    <p:sldId id="261" r:id="rId8"/>
+    <p:sldId id="257" r:id="rId9"/>
+    <p:sldId id="258" r:id="rId10"/>
   </p:sldIdLst>
   <p:sldSz cx="10080625" cy="5670550"/>
   <p:notesSz cx="7772400" cy="10058400"/>
@@ -961,7 +962,7 @@
           <a:p>
             <a:pPr lvl="0"/>
             <a:fld id="{E9625CB8-1CC2-490B-B45F-1AADA9F9165D}" type="slidenum">
-              <a:t>6</a:t>
+              <a:t>2</a:t>
             </a:fld>
             <a:endParaRPr lang="en-US"/>
           </a:p>
@@ -1027,7 +1028,7 @@
     </p:spTree>
     <p:extLst>
       <p:ext uri="{BB962C8B-B14F-4D97-AF65-F5344CB8AC3E}">
-        <p14:creationId xmlns:p14="http://schemas.microsoft.com/office/powerpoint/2010/main" val="3822367015"/>
+        <p14:creationId xmlns:p14="http://schemas.microsoft.com/office/powerpoint/2010/main" val="1167214475"/>
       </p:ext>
     </p:extLst>
   </p:cSld>
@@ -1038,6 +1039,126 @@
 </file>
 
 <file path=ppt/notesSlides/notesSlide3.xml><?xml version="1.0" encoding="utf-8"?>
+<p:notes xmlns:a="http://schemas.openxmlformats.org/drawingml/2006/main" xmlns:r="http://schemas.openxmlformats.org/officeDocument/2006/relationships" xmlns:p="http://schemas.openxmlformats.org/presentationml/2006/main">
+  <p:cSld>
+    <p:spTree>
+      <p:nvGrpSpPr>
+        <p:cNvPr id="1" name=""/>
+        <p:cNvGrpSpPr/>
+        <p:nvPr/>
+      </p:nvGrpSpPr>
+      <p:grpSpPr>
+        <a:xfrm>
+          <a:off x="0" y="0"/>
+          <a:ext cx="0" cy="0"/>
+          <a:chOff x="0" y="0"/>
+          <a:chExt cx="0" cy="0"/>
+        </a:xfrm>
+      </p:grpSpPr>
+      <p:sp>
+        <p:nvSpPr>
+          <p:cNvPr id="7" name="Slide Number Placeholder 6">
+            <a:extLst>
+              <a:ext uri="{FF2B5EF4-FFF2-40B4-BE49-F238E27FC236}">
+                <a16:creationId xmlns:a16="http://schemas.microsoft.com/office/drawing/2014/main" id="{BB5185B3-C4B2-4F52-A75F-9051C79EC4B7}"/>
+              </a:ext>
+            </a:extLst>
+          </p:cNvPr>
+          <p:cNvSpPr txBox="1">
+            <a:spLocks noGrp="1"/>
+          </p:cNvSpPr>
+          <p:nvPr>
+            <p:ph type="sldNum" sz="quarter" idx="5"/>
+          </p:nvPr>
+        </p:nvSpPr>
+        <p:spPr>
+          <a:ln/>
+        </p:spPr>
+        <p:txBody>
+          <a:bodyPr vert="horz" lIns="0" tIns="0" rIns="0" bIns="0" anchor="b" anchorCtr="0">
+            <a:noAutofit/>
+          </a:bodyPr>
+          <a:lstStyle/>
+          <a:p>
+            <a:pPr lvl="0"/>
+            <a:fld id="{E9625CB8-1CC2-490B-B45F-1AADA9F9165D}" type="slidenum">
+              <a:t>3</a:t>
+            </a:fld>
+            <a:endParaRPr lang="en-US"/>
+          </a:p>
+        </p:txBody>
+      </p:sp>
+      <p:sp>
+        <p:nvSpPr>
+          <p:cNvPr id="2" name="Slide Image Placeholder 1">
+            <a:extLst>
+              <a:ext uri="{FF2B5EF4-FFF2-40B4-BE49-F238E27FC236}">
+                <a16:creationId xmlns:a16="http://schemas.microsoft.com/office/drawing/2014/main" id="{1E9D9290-547E-42DA-BB6F-7D447BF7E065}"/>
+              </a:ext>
+            </a:extLst>
+          </p:cNvPr>
+          <p:cNvSpPr>
+            <a:spLocks noGrp="1" noRot="1" noChangeAspect="1" noResize="1"/>
+          </p:cNvSpPr>
+          <p:nvPr>
+            <p:ph type="sldImg"/>
+          </p:nvPr>
+        </p:nvSpPr>
+        <p:spPr>
+          <a:xfrm>
+            <a:off x="533400" y="763588"/>
+            <a:ext cx="6704013" cy="3771900"/>
+          </a:xfrm>
+          <a:solidFill>
+            <a:srgbClr val="729FCF"/>
+          </a:solidFill>
+          <a:ln w="25400">
+            <a:solidFill>
+              <a:srgbClr val="3465A4"/>
+            </a:solidFill>
+            <a:prstDash val="solid"/>
+          </a:ln>
+        </p:spPr>
+      </p:sp>
+      <p:sp>
+        <p:nvSpPr>
+          <p:cNvPr id="3" name="Notes Placeholder 2">
+            <a:extLst>
+              <a:ext uri="{FF2B5EF4-FFF2-40B4-BE49-F238E27FC236}">
+                <a16:creationId xmlns:a16="http://schemas.microsoft.com/office/drawing/2014/main" id="{EC4F695F-73B9-4D5D-8839-B4589C8F9088}"/>
+              </a:ext>
+            </a:extLst>
+          </p:cNvPr>
+          <p:cNvSpPr txBox="1">
+            <a:spLocks noGrp="1"/>
+          </p:cNvSpPr>
+          <p:nvPr>
+            <p:ph type="body" sz="quarter" idx="1"/>
+          </p:nvPr>
+        </p:nvSpPr>
+        <p:spPr/>
+        <p:txBody>
+          <a:bodyPr vert="horz"/>
+          <a:lstStyle/>
+          <a:p>
+            <a:endParaRPr lang="en-US"/>
+          </a:p>
+        </p:txBody>
+      </p:sp>
+    </p:spTree>
+    <p:extLst>
+      <p:ext uri="{BB962C8B-B14F-4D97-AF65-F5344CB8AC3E}">
+        <p14:creationId xmlns:p14="http://schemas.microsoft.com/office/powerpoint/2010/main" val="2142060233"/>
+      </p:ext>
+    </p:extLst>
+  </p:cSld>
+  <p:clrMapOvr>
+    <a:masterClrMapping/>
+  </p:clrMapOvr>
+</p:notes>
+</file>
+
+<file path=ppt/notesSlides/notesSlide4.xml><?xml version="1.0" encoding="utf-8"?>
 <p:notes xmlns:a="http://schemas.openxmlformats.org/drawingml/2006/main" xmlns:r="http://schemas.openxmlformats.org/officeDocument/2006/relationships" xmlns:p="http://schemas.openxmlformats.org/presentationml/2006/main">
   <p:cSld>
     <p:spTree>
@@ -1081,7 +1202,7 @@
           <a:p>
             <a:pPr lvl="0"/>
             <a:fld id="{B1735628-FC1A-4F43-B44E-46B901F62798}" type="slidenum">
-              <a:t>7</a:t>
+              <a:t>8</a:t>
             </a:fld>
             <a:endParaRPr lang="en-US"/>
           </a:p>
@@ -5582,6 +5703,2172 @@
           <a:chExt cx="0" cy="0"/>
         </a:xfrm>
       </p:grpSpPr>
+      <p:sp>
+        <p:nvSpPr>
+          <p:cNvPr id="2" name="Title 1">
+            <a:extLst>
+              <a:ext uri="{FF2B5EF4-FFF2-40B4-BE49-F238E27FC236}">
+                <a16:creationId xmlns:a16="http://schemas.microsoft.com/office/drawing/2014/main" id="{0BBA1E42-504A-4394-9885-44ACD2FD632B}"/>
+              </a:ext>
+            </a:extLst>
+          </p:cNvPr>
+          <p:cNvSpPr txBox="1">
+            <a:spLocks noGrp="1"/>
+          </p:cNvSpPr>
+          <p:nvPr>
+            <p:ph type="title" idx="4294967295"/>
+          </p:nvPr>
+        </p:nvSpPr>
+        <p:spPr>
+          <a:xfrm>
+            <a:off x="410215" y="0"/>
+            <a:ext cx="9581848" cy="891136"/>
+          </a:xfrm>
+        </p:spPr>
+        <p:txBody>
+          <a:bodyPr vert="horz"/>
+          <a:lstStyle/>
+          <a:p>
+            <a:pPr lvl="0"/>
+            <a:r>
+              <a:rPr lang="en-US" sz="2000" dirty="0"/>
+              <a:t>Quick Comparison on Yahoo A3 Benchmark Dataset – 100 Time Series</a:t>
+            </a:r>
+          </a:p>
+        </p:txBody>
+      </p:sp>
+      <p:graphicFrame>
+        <p:nvGraphicFramePr>
+          <p:cNvPr id="4" name="Table 3">
+            <a:extLst>
+              <a:ext uri="{FF2B5EF4-FFF2-40B4-BE49-F238E27FC236}">
+                <a16:creationId xmlns:a16="http://schemas.microsoft.com/office/drawing/2014/main" id="{A47452BE-25FD-4945-B15C-7AB50AB45EC8}"/>
+              </a:ext>
+            </a:extLst>
+          </p:cNvPr>
+          <p:cNvGraphicFramePr>
+            <a:graphicFrameLocks noGrp="1"/>
+          </p:cNvGraphicFramePr>
+          <p:nvPr>
+            <p:extLst>
+              <p:ext uri="{D42A27DB-BD31-4B8C-83A1-F6EECF244321}">
+                <p14:modId xmlns:p14="http://schemas.microsoft.com/office/powerpoint/2010/main" val="2488951530"/>
+              </p:ext>
+            </p:extLst>
+          </p:nvPr>
+        </p:nvGraphicFramePr>
+        <p:xfrm>
+          <a:off x="410214" y="891136"/>
+          <a:ext cx="9035444" cy="4503429"/>
+        </p:xfrm>
+        <a:graphic>
+          <a:graphicData uri="http://schemas.openxmlformats.org/drawingml/2006/table">
+            <a:tbl>
+              <a:tblPr firstRow="1" bandRow="1">
+                <a:tableStyleId>{E238C490-6FC5-45BF-8602-39B36D2FA802}</a:tableStyleId>
+              </a:tblPr>
+              <a:tblGrid>
+                <a:gridCol w="1709039">
+                  <a:extLst>
+                    <a:ext uri="{9D8B030D-6E8A-4147-A177-3AD203B41FA5}">
+                      <a16:colId xmlns:a16="http://schemas.microsoft.com/office/drawing/2014/main" val="549638599"/>
+                    </a:ext>
+                  </a:extLst>
+                </a:gridCol>
+                <a:gridCol w="1299989">
+                  <a:extLst>
+                    <a:ext uri="{9D8B030D-6E8A-4147-A177-3AD203B41FA5}">
+                      <a16:colId xmlns:a16="http://schemas.microsoft.com/office/drawing/2014/main" val="388096317"/>
+                    </a:ext>
+                  </a:extLst>
+                </a:gridCol>
+                <a:gridCol w="1504514">
+                  <a:extLst>
+                    <a:ext uri="{9D8B030D-6E8A-4147-A177-3AD203B41FA5}">
+                      <a16:colId xmlns:a16="http://schemas.microsoft.com/office/drawing/2014/main" val="2056048235"/>
+                    </a:ext>
+                  </a:extLst>
+                </a:gridCol>
+                <a:gridCol w="1504514">
+                  <a:extLst>
+                    <a:ext uri="{9D8B030D-6E8A-4147-A177-3AD203B41FA5}">
+                      <a16:colId xmlns:a16="http://schemas.microsoft.com/office/drawing/2014/main" val="2653049669"/>
+                    </a:ext>
+                  </a:extLst>
+                </a:gridCol>
+                <a:gridCol w="1508694">
+                  <a:extLst>
+                    <a:ext uri="{9D8B030D-6E8A-4147-A177-3AD203B41FA5}">
+                      <a16:colId xmlns:a16="http://schemas.microsoft.com/office/drawing/2014/main" val="2807278400"/>
+                    </a:ext>
+                  </a:extLst>
+                </a:gridCol>
+                <a:gridCol w="1508694">
+                  <a:extLst>
+                    <a:ext uri="{9D8B030D-6E8A-4147-A177-3AD203B41FA5}">
+                      <a16:colId xmlns:a16="http://schemas.microsoft.com/office/drawing/2014/main" val="3910885709"/>
+                    </a:ext>
+                  </a:extLst>
+                </a:gridCol>
+              </a:tblGrid>
+              <a:tr h="889494">
+                <a:tc>
+                  <a:txBody>
+                    <a:bodyPr/>
+                    <a:lstStyle/>
+                    <a:p>
+                      <a:pPr marL="0" marR="0" lvl="0" indent="0" rtl="0" hangingPunct="0">
+                        <a:lnSpc>
+                          <a:spcPct val="100000"/>
+                        </a:lnSpc>
+                        <a:spcBef>
+                          <a:spcPts val="0"/>
+                        </a:spcBef>
+                        <a:spcAft>
+                          <a:spcPts val="0"/>
+                        </a:spcAft>
+                        <a:buNone/>
+                        <a:tabLst/>
+                      </a:pPr>
+                      <a:r>
+                        <a:rPr lang="en-US" sz="1800" b="0" i="0" u="none" strike="noStrike" kern="1200" cap="none" dirty="0">
+                          <a:ln>
+                            <a:noFill/>
+                          </a:ln>
+                          <a:latin typeface="Liberation Sans" pitchFamily="34"/>
+                          <a:ea typeface="Noto Sans CJK SC" pitchFamily="2"/>
+                          <a:cs typeface="Lohit Devanagari" pitchFamily="2"/>
+                        </a:rPr>
+                        <a:t>Metric\Model</a:t>
+                      </a:r>
+                    </a:p>
+                  </a:txBody>
+                  <a:tcPr/>
+                </a:tc>
+                <a:tc>
+                  <a:txBody>
+                    <a:bodyPr/>
+                    <a:lstStyle/>
+                    <a:p>
+                      <a:pPr marL="0" marR="0" lvl="0" indent="0" rtl="0" hangingPunct="0">
+                        <a:lnSpc>
+                          <a:spcPct val="100000"/>
+                        </a:lnSpc>
+                        <a:spcBef>
+                          <a:spcPts val="0"/>
+                        </a:spcBef>
+                        <a:spcAft>
+                          <a:spcPts val="0"/>
+                        </a:spcAft>
+                        <a:buNone/>
+                        <a:tabLst/>
+                        <a:defRPr sz="1800">
+                          <a:latin typeface="Liberation Sans" pitchFamily="34"/>
+                        </a:defRPr>
+                      </a:pPr>
+                      <a:r>
+                        <a:rPr lang="en-US" sz="1800" b="0" i="0" u="none" strike="noStrike" kern="1200" cap="none">
+                          <a:ln>
+                            <a:noFill/>
+                          </a:ln>
+                          <a:latin typeface="Liberation Sans" pitchFamily="34"/>
+                          <a:ea typeface="Noto Sans CJK SC" pitchFamily="2"/>
+                          <a:cs typeface="Lohit Devanagari" pitchFamily="2"/>
+                        </a:rPr>
+                        <a:t>AR</a:t>
+                      </a:r>
+                    </a:p>
+                  </a:txBody>
+                  <a:tcPr/>
+                </a:tc>
+                <a:tc>
+                  <a:txBody>
+                    <a:bodyPr/>
+                    <a:lstStyle/>
+                    <a:p>
+                      <a:pPr marL="0" marR="0" lvl="0" indent="0" rtl="0" hangingPunct="0">
+                        <a:lnSpc>
+                          <a:spcPct val="100000"/>
+                        </a:lnSpc>
+                        <a:spcBef>
+                          <a:spcPts val="0"/>
+                        </a:spcBef>
+                        <a:spcAft>
+                          <a:spcPts val="0"/>
+                        </a:spcAft>
+                        <a:buNone/>
+                        <a:tabLst/>
+                        <a:defRPr sz="1800">
+                          <a:latin typeface="Liberation Sans" pitchFamily="34"/>
+                        </a:defRPr>
+                      </a:pPr>
+                      <a:r>
+                        <a:rPr lang="en-US" sz="1800" b="0" i="0" u="none" strike="noStrike" kern="1200" cap="none" dirty="0">
+                          <a:ln>
+                            <a:noFill/>
+                          </a:ln>
+                          <a:latin typeface="Liberation Sans" pitchFamily="34"/>
+                          <a:ea typeface="Noto Sans CJK SC" pitchFamily="2"/>
+                          <a:cs typeface="Lohit Devanagari" pitchFamily="2"/>
+                        </a:rPr>
+                        <a:t>MA</a:t>
+                      </a:r>
+                    </a:p>
+                  </a:txBody>
+                  <a:tcPr/>
+                </a:tc>
+                <a:tc>
+                  <a:txBody>
+                    <a:bodyPr/>
+                    <a:lstStyle/>
+                    <a:p>
+                      <a:pPr marL="0" marR="0" lvl="0" indent="0" rtl="0" hangingPunct="0">
+                        <a:lnSpc>
+                          <a:spcPct val="100000"/>
+                        </a:lnSpc>
+                        <a:spcBef>
+                          <a:spcPts val="0"/>
+                        </a:spcBef>
+                        <a:spcAft>
+                          <a:spcPts val="0"/>
+                        </a:spcAft>
+                        <a:buNone/>
+                        <a:tabLst/>
+                        <a:defRPr sz="1800">
+                          <a:latin typeface="Liberation Sans" pitchFamily="34"/>
+                        </a:defRPr>
+                      </a:pPr>
+                      <a:r>
+                        <a:rPr lang="en-US" sz="1800" b="0" i="0" u="none" strike="noStrike" kern="1200" cap="none">
+                          <a:ln>
+                            <a:noFill/>
+                          </a:ln>
+                          <a:latin typeface="Liberation Sans" pitchFamily="34"/>
+                          <a:ea typeface="Noto Sans CJK SC" pitchFamily="2"/>
+                          <a:cs typeface="Lohit Devanagari" pitchFamily="2"/>
+                        </a:rPr>
+                        <a:t>ARIMA</a:t>
+                      </a:r>
+                    </a:p>
+                  </a:txBody>
+                  <a:tcPr/>
+                </a:tc>
+                <a:tc>
+                  <a:txBody>
+                    <a:bodyPr/>
+                    <a:lstStyle/>
+                    <a:p>
+                      <a:pPr marL="0" marR="0" lvl="0" indent="0" rtl="0" hangingPunct="0">
+                        <a:lnSpc>
+                          <a:spcPct val="100000"/>
+                        </a:lnSpc>
+                        <a:spcBef>
+                          <a:spcPts val="0"/>
+                        </a:spcBef>
+                        <a:spcAft>
+                          <a:spcPts val="0"/>
+                        </a:spcAft>
+                        <a:buNone/>
+                        <a:tabLst/>
+                        <a:defRPr sz="1800">
+                          <a:latin typeface="Liberation Sans" pitchFamily="34"/>
+                        </a:defRPr>
+                      </a:pPr>
+                      <a:r>
+                        <a:rPr lang="en-US" sz="1800" b="0" i="0" u="none" strike="noStrike" kern="1200" cap="none" dirty="0">
+                          <a:ln>
+                            <a:noFill/>
+                          </a:ln>
+                          <a:latin typeface="Liberation Sans" pitchFamily="34"/>
+                          <a:ea typeface="Noto Sans CJK SC" pitchFamily="2"/>
+                          <a:cs typeface="Lohit Devanagari" pitchFamily="2"/>
+                        </a:rPr>
+                        <a:t>STL</a:t>
+                      </a:r>
+                    </a:p>
+                  </a:txBody>
+                  <a:tcPr/>
+                </a:tc>
+                <a:tc>
+                  <a:txBody>
+                    <a:bodyPr/>
+                    <a:lstStyle/>
+                    <a:p>
+                      <a:pPr marL="0" marR="0" lvl="0" indent="0" rtl="0" hangingPunct="0">
+                        <a:lnSpc>
+                          <a:spcPct val="100000"/>
+                        </a:lnSpc>
+                        <a:spcBef>
+                          <a:spcPts val="0"/>
+                        </a:spcBef>
+                        <a:spcAft>
+                          <a:spcPts val="0"/>
+                        </a:spcAft>
+                        <a:buNone/>
+                        <a:tabLst/>
+                        <a:defRPr sz="1800">
+                          <a:latin typeface="Liberation Sans" pitchFamily="34"/>
+                        </a:defRPr>
+                      </a:pPr>
+                      <a:r>
+                        <a:rPr lang="en-US" sz="1800" b="0" i="0" u="none" strike="noStrike" kern="1200" cap="none" dirty="0">
+                          <a:ln>
+                            <a:noFill/>
+                          </a:ln>
+                          <a:latin typeface="Liberation Sans" pitchFamily="34"/>
+                          <a:ea typeface="Noto Sans CJK SC" pitchFamily="2"/>
+                          <a:cs typeface="Lohit Devanagari" pitchFamily="2"/>
+                        </a:rPr>
+                        <a:t>HW</a:t>
+                      </a:r>
+                    </a:p>
+                  </a:txBody>
+                  <a:tcPr/>
+                </a:tc>
+                <a:extLst>
+                  <a:ext uri="{0D108BD9-81ED-4DB2-BD59-A6C34878D82A}">
+                    <a16:rowId xmlns:a16="http://schemas.microsoft.com/office/drawing/2014/main" val="426170887"/>
+                  </a:ext>
+                </a:extLst>
+              </a:tr>
+              <a:tr h="889494">
+                <a:tc>
+                  <a:txBody>
+                    <a:bodyPr/>
+                    <a:lstStyle/>
+                    <a:p>
+                      <a:pPr marL="0" marR="0" lvl="0" indent="0" rtl="0" hangingPunct="0">
+                        <a:lnSpc>
+                          <a:spcPct val="100000"/>
+                        </a:lnSpc>
+                        <a:spcBef>
+                          <a:spcPts val="0"/>
+                        </a:spcBef>
+                        <a:spcAft>
+                          <a:spcPts val="0"/>
+                        </a:spcAft>
+                        <a:buNone/>
+                        <a:tabLst/>
+                        <a:defRPr sz="1800">
+                          <a:latin typeface="Liberation Sans" pitchFamily="34"/>
+                        </a:defRPr>
+                      </a:pPr>
+                      <a:r>
+                        <a:rPr lang="en-US" sz="1800" b="0" i="0" u="none" strike="noStrike" kern="1200" cap="none" dirty="0">
+                          <a:ln>
+                            <a:noFill/>
+                          </a:ln>
+                          <a:latin typeface="Liberation Sans" pitchFamily="34"/>
+                          <a:ea typeface="Noto Sans CJK SC" pitchFamily="2"/>
+                          <a:cs typeface="Lohit Devanagari" pitchFamily="2"/>
+                        </a:rPr>
+                        <a:t>Avg F1</a:t>
+                      </a:r>
+                    </a:p>
+                  </a:txBody>
+                  <a:tcPr/>
+                </a:tc>
+                <a:tc>
+                  <a:txBody>
+                    <a:bodyPr/>
+                    <a:lstStyle/>
+                    <a:p>
+                      <a:pPr marL="0" marR="0" indent="0" rtl="0" hangingPunct="0">
+                        <a:lnSpc>
+                          <a:spcPct val="100000"/>
+                        </a:lnSpc>
+                        <a:spcBef>
+                          <a:spcPts val="0"/>
+                        </a:spcBef>
+                        <a:spcAft>
+                          <a:spcPts val="0"/>
+                        </a:spcAft>
+                        <a:tabLst/>
+                      </a:pPr>
+                      <a:endParaRPr lang="en-US" sz="1800" b="0" i="0" u="none" strike="noStrike" kern="1200" cap="none" dirty="0">
+                        <a:ln>
+                          <a:noFill/>
+                        </a:ln>
+                        <a:latin typeface="Liberation Sans" pitchFamily="18"/>
+                      </a:endParaRPr>
+                    </a:p>
+                  </a:txBody>
+                  <a:tcPr/>
+                </a:tc>
+                <a:tc>
+                  <a:txBody>
+                    <a:bodyPr/>
+                    <a:lstStyle/>
+                    <a:p>
+                      <a:pPr marL="0" marR="0" indent="0" rtl="0" hangingPunct="0">
+                        <a:lnSpc>
+                          <a:spcPct val="100000"/>
+                        </a:lnSpc>
+                        <a:spcBef>
+                          <a:spcPts val="0"/>
+                        </a:spcBef>
+                        <a:spcAft>
+                          <a:spcPts val="0"/>
+                        </a:spcAft>
+                        <a:tabLst/>
+                      </a:pPr>
+                      <a:endParaRPr lang="en-US" sz="1800" b="0" i="0" u="none" strike="noStrike" kern="1200" cap="none" dirty="0">
+                        <a:ln>
+                          <a:noFill/>
+                        </a:ln>
+                        <a:latin typeface="Liberation Sans" pitchFamily="18"/>
+                      </a:endParaRPr>
+                    </a:p>
+                  </a:txBody>
+                  <a:tcPr/>
+                </a:tc>
+                <a:tc>
+                  <a:txBody>
+                    <a:bodyPr/>
+                    <a:lstStyle/>
+                    <a:p>
+                      <a:pPr marL="0" marR="0" indent="0" rtl="0" hangingPunct="0">
+                        <a:lnSpc>
+                          <a:spcPct val="100000"/>
+                        </a:lnSpc>
+                        <a:spcBef>
+                          <a:spcPts val="0"/>
+                        </a:spcBef>
+                        <a:spcAft>
+                          <a:spcPts val="0"/>
+                        </a:spcAft>
+                        <a:tabLst/>
+                      </a:pPr>
+                      <a:endParaRPr lang="en-US" sz="1800" b="0" i="0" u="none" strike="noStrike" kern="1200" cap="none" dirty="0">
+                        <a:ln>
+                          <a:noFill/>
+                        </a:ln>
+                        <a:latin typeface="Liberation Sans" pitchFamily="18"/>
+                      </a:endParaRPr>
+                    </a:p>
+                  </a:txBody>
+                  <a:tcPr/>
+                </a:tc>
+                <a:tc>
+                  <a:txBody>
+                    <a:bodyPr/>
+                    <a:lstStyle/>
+                    <a:p>
+                      <a:pPr marL="0" marR="0" indent="0" rtl="0" hangingPunct="0">
+                        <a:lnSpc>
+                          <a:spcPct val="100000"/>
+                        </a:lnSpc>
+                        <a:spcBef>
+                          <a:spcPts val="0"/>
+                        </a:spcBef>
+                        <a:spcAft>
+                          <a:spcPts val="0"/>
+                        </a:spcAft>
+                        <a:tabLst/>
+                      </a:pPr>
+                      <a:endParaRPr lang="en-US" sz="1800" b="0" i="0" u="none" strike="noStrike" kern="1200" cap="none" dirty="0">
+                        <a:ln>
+                          <a:noFill/>
+                        </a:ln>
+                        <a:latin typeface="Liberation Sans" pitchFamily="18"/>
+                      </a:endParaRPr>
+                    </a:p>
+                  </a:txBody>
+                  <a:tcPr/>
+                </a:tc>
+                <a:tc>
+                  <a:txBody>
+                    <a:bodyPr/>
+                    <a:lstStyle/>
+                    <a:p>
+                      <a:pPr marL="0" marR="0" lvl="0" indent="0" rtl="0" hangingPunct="0">
+                        <a:lnSpc>
+                          <a:spcPct val="100000"/>
+                        </a:lnSpc>
+                        <a:spcBef>
+                          <a:spcPts val="0"/>
+                        </a:spcBef>
+                        <a:spcAft>
+                          <a:spcPts val="0"/>
+                        </a:spcAft>
+                        <a:buNone/>
+                        <a:tabLst/>
+                        <a:defRPr sz="1800">
+                          <a:latin typeface="Liberation Sans" pitchFamily="34"/>
+                        </a:defRPr>
+                      </a:pPr>
+                      <a:endParaRPr lang="en-US" sz="1800" b="0" i="0" u="none" strike="noStrike" kern="1200" cap="none" dirty="0">
+                        <a:ln>
+                          <a:noFill/>
+                        </a:ln>
+                        <a:latin typeface="Liberation Sans" pitchFamily="34"/>
+                        <a:ea typeface="Noto Sans CJK SC" pitchFamily="2"/>
+                        <a:cs typeface="Lohit Devanagari" pitchFamily="2"/>
+                      </a:endParaRPr>
+                    </a:p>
+                  </a:txBody>
+                  <a:tcPr/>
+                </a:tc>
+                <a:extLst>
+                  <a:ext uri="{0D108BD9-81ED-4DB2-BD59-A6C34878D82A}">
+                    <a16:rowId xmlns:a16="http://schemas.microsoft.com/office/drawing/2014/main" val="1668712776"/>
+                  </a:ext>
+                </a:extLst>
+              </a:tr>
+              <a:tr h="889494">
+                <a:tc>
+                  <a:txBody>
+                    <a:bodyPr/>
+                    <a:lstStyle/>
+                    <a:p>
+                      <a:pPr marL="0" marR="0" lvl="0" indent="0" rtl="0" hangingPunct="0">
+                        <a:lnSpc>
+                          <a:spcPct val="100000"/>
+                        </a:lnSpc>
+                        <a:spcBef>
+                          <a:spcPts val="0"/>
+                        </a:spcBef>
+                        <a:spcAft>
+                          <a:spcPts val="0"/>
+                        </a:spcAft>
+                        <a:buNone/>
+                        <a:tabLst/>
+                        <a:defRPr sz="1800">
+                          <a:latin typeface="Liberation Sans" pitchFamily="34"/>
+                        </a:defRPr>
+                      </a:pPr>
+                      <a:r>
+                        <a:rPr lang="en-US" sz="1800" b="0" i="0" u="none" strike="noStrike" kern="1200" cap="none">
+                          <a:ln>
+                            <a:noFill/>
+                          </a:ln>
+                          <a:latin typeface="Liberation Sans" pitchFamily="34"/>
+                          <a:ea typeface="Noto Sans CJK SC" pitchFamily="2"/>
+                          <a:cs typeface="Lohit Devanagari" pitchFamily="2"/>
+                        </a:rPr>
+                        <a:t>Avg Precision</a:t>
+                      </a:r>
+                    </a:p>
+                  </a:txBody>
+                  <a:tcPr/>
+                </a:tc>
+                <a:tc>
+                  <a:txBody>
+                    <a:bodyPr/>
+                    <a:lstStyle/>
+                    <a:p>
+                      <a:pPr marL="0" marR="0" indent="0" rtl="0" hangingPunct="0">
+                        <a:lnSpc>
+                          <a:spcPct val="100000"/>
+                        </a:lnSpc>
+                        <a:spcBef>
+                          <a:spcPts val="0"/>
+                        </a:spcBef>
+                        <a:spcAft>
+                          <a:spcPts val="0"/>
+                        </a:spcAft>
+                        <a:tabLst/>
+                      </a:pPr>
+                      <a:endParaRPr lang="en-US" sz="1800" b="0" i="0" u="none" strike="noStrike" kern="1200" cap="none" dirty="0">
+                        <a:ln>
+                          <a:noFill/>
+                        </a:ln>
+                        <a:latin typeface="Liberation Sans" pitchFamily="18"/>
+                      </a:endParaRPr>
+                    </a:p>
+                  </a:txBody>
+                  <a:tcPr/>
+                </a:tc>
+                <a:tc>
+                  <a:txBody>
+                    <a:bodyPr/>
+                    <a:lstStyle/>
+                    <a:p>
+                      <a:pPr marL="0" marR="0" indent="0" rtl="0" hangingPunct="0">
+                        <a:lnSpc>
+                          <a:spcPct val="100000"/>
+                        </a:lnSpc>
+                        <a:spcBef>
+                          <a:spcPts val="0"/>
+                        </a:spcBef>
+                        <a:spcAft>
+                          <a:spcPts val="0"/>
+                        </a:spcAft>
+                        <a:tabLst/>
+                      </a:pPr>
+                      <a:endParaRPr lang="en-US" sz="1800" b="0" i="0" u="none" strike="noStrike" kern="1200" cap="none" dirty="0">
+                        <a:ln>
+                          <a:noFill/>
+                        </a:ln>
+                        <a:latin typeface="Liberation Sans" pitchFamily="18"/>
+                      </a:endParaRPr>
+                    </a:p>
+                  </a:txBody>
+                  <a:tcPr/>
+                </a:tc>
+                <a:tc>
+                  <a:txBody>
+                    <a:bodyPr/>
+                    <a:lstStyle/>
+                    <a:p>
+                      <a:pPr marL="0" marR="0" indent="0" rtl="0" hangingPunct="0">
+                        <a:lnSpc>
+                          <a:spcPct val="100000"/>
+                        </a:lnSpc>
+                        <a:spcBef>
+                          <a:spcPts val="0"/>
+                        </a:spcBef>
+                        <a:spcAft>
+                          <a:spcPts val="0"/>
+                        </a:spcAft>
+                        <a:tabLst/>
+                      </a:pPr>
+                      <a:endParaRPr lang="en-US" sz="1800" b="0" i="0" u="none" strike="noStrike" kern="1200" cap="none" dirty="0">
+                        <a:ln>
+                          <a:noFill/>
+                        </a:ln>
+                        <a:latin typeface="Liberation Sans" pitchFamily="18"/>
+                      </a:endParaRPr>
+                    </a:p>
+                  </a:txBody>
+                  <a:tcPr/>
+                </a:tc>
+                <a:tc>
+                  <a:txBody>
+                    <a:bodyPr/>
+                    <a:lstStyle/>
+                    <a:p>
+                      <a:pPr marL="0" marR="0" indent="0" rtl="0" hangingPunct="0">
+                        <a:lnSpc>
+                          <a:spcPct val="100000"/>
+                        </a:lnSpc>
+                        <a:spcBef>
+                          <a:spcPts val="0"/>
+                        </a:spcBef>
+                        <a:spcAft>
+                          <a:spcPts val="0"/>
+                        </a:spcAft>
+                        <a:tabLst/>
+                      </a:pPr>
+                      <a:endParaRPr lang="en-US" sz="1800" b="0" i="0" u="none" strike="noStrike" kern="1200" cap="none" dirty="0">
+                        <a:ln>
+                          <a:noFill/>
+                        </a:ln>
+                        <a:latin typeface="Liberation Sans" pitchFamily="18"/>
+                      </a:endParaRPr>
+                    </a:p>
+                  </a:txBody>
+                  <a:tcPr/>
+                </a:tc>
+                <a:tc>
+                  <a:txBody>
+                    <a:bodyPr/>
+                    <a:lstStyle/>
+                    <a:p>
+                      <a:pPr marL="0" marR="0" indent="0" rtl="0" hangingPunct="0">
+                        <a:lnSpc>
+                          <a:spcPct val="100000"/>
+                        </a:lnSpc>
+                        <a:spcBef>
+                          <a:spcPts val="0"/>
+                        </a:spcBef>
+                        <a:spcAft>
+                          <a:spcPts val="0"/>
+                        </a:spcAft>
+                        <a:tabLst/>
+                      </a:pPr>
+                      <a:endParaRPr lang="en-US" sz="1800" b="0" i="0" u="none" strike="noStrike" kern="1200" cap="none" dirty="0">
+                        <a:ln>
+                          <a:noFill/>
+                        </a:ln>
+                        <a:latin typeface="Liberation Sans" pitchFamily="18"/>
+                      </a:endParaRPr>
+                    </a:p>
+                  </a:txBody>
+                  <a:tcPr/>
+                </a:tc>
+                <a:extLst>
+                  <a:ext uri="{0D108BD9-81ED-4DB2-BD59-A6C34878D82A}">
+                    <a16:rowId xmlns:a16="http://schemas.microsoft.com/office/drawing/2014/main" val="2522885085"/>
+                  </a:ext>
+                </a:extLst>
+              </a:tr>
+              <a:tr h="678605">
+                <a:tc>
+                  <a:txBody>
+                    <a:bodyPr/>
+                    <a:lstStyle/>
+                    <a:p>
+                      <a:pPr marL="0" marR="0" lvl="0" indent="0" rtl="0" hangingPunct="0">
+                        <a:lnSpc>
+                          <a:spcPct val="100000"/>
+                        </a:lnSpc>
+                        <a:spcBef>
+                          <a:spcPts val="0"/>
+                        </a:spcBef>
+                        <a:spcAft>
+                          <a:spcPts val="0"/>
+                        </a:spcAft>
+                        <a:buNone/>
+                        <a:tabLst/>
+                        <a:defRPr sz="1800">
+                          <a:latin typeface="Liberation Sans" pitchFamily="34"/>
+                        </a:defRPr>
+                      </a:pPr>
+                      <a:r>
+                        <a:rPr lang="en-US" sz="1800" b="0" i="0" u="none" strike="noStrike" kern="1200" cap="none">
+                          <a:ln>
+                            <a:noFill/>
+                          </a:ln>
+                          <a:latin typeface="Liberation Sans" pitchFamily="34"/>
+                          <a:ea typeface="Noto Sans CJK SC" pitchFamily="2"/>
+                          <a:cs typeface="Lohit Devanagari" pitchFamily="2"/>
+                        </a:rPr>
+                        <a:t>Avg Recall</a:t>
+                      </a:r>
+                    </a:p>
+                  </a:txBody>
+                  <a:tcPr/>
+                </a:tc>
+                <a:tc>
+                  <a:txBody>
+                    <a:bodyPr/>
+                    <a:lstStyle/>
+                    <a:p>
+                      <a:pPr marL="0" marR="0" indent="0" rtl="0" hangingPunct="0">
+                        <a:lnSpc>
+                          <a:spcPct val="100000"/>
+                        </a:lnSpc>
+                        <a:spcBef>
+                          <a:spcPts val="0"/>
+                        </a:spcBef>
+                        <a:spcAft>
+                          <a:spcPts val="0"/>
+                        </a:spcAft>
+                        <a:tabLst/>
+                      </a:pPr>
+                      <a:endParaRPr lang="en-US" sz="1800" b="0" i="0" u="none" strike="noStrike" kern="1200" cap="none" dirty="0">
+                        <a:ln>
+                          <a:noFill/>
+                        </a:ln>
+                        <a:latin typeface="Liberation Sans" pitchFamily="18"/>
+                      </a:endParaRPr>
+                    </a:p>
+                  </a:txBody>
+                  <a:tcPr/>
+                </a:tc>
+                <a:tc>
+                  <a:txBody>
+                    <a:bodyPr/>
+                    <a:lstStyle/>
+                    <a:p>
+                      <a:pPr marL="0" marR="0" indent="0" rtl="0" hangingPunct="0">
+                        <a:lnSpc>
+                          <a:spcPct val="100000"/>
+                        </a:lnSpc>
+                        <a:spcBef>
+                          <a:spcPts val="0"/>
+                        </a:spcBef>
+                        <a:spcAft>
+                          <a:spcPts val="0"/>
+                        </a:spcAft>
+                        <a:tabLst/>
+                      </a:pPr>
+                      <a:endParaRPr lang="en-US" sz="1800" b="0" i="0" u="none" strike="noStrike" kern="1200" cap="none" dirty="0">
+                        <a:ln>
+                          <a:noFill/>
+                        </a:ln>
+                        <a:latin typeface="Liberation Sans" pitchFamily="18"/>
+                      </a:endParaRPr>
+                    </a:p>
+                  </a:txBody>
+                  <a:tcPr/>
+                </a:tc>
+                <a:tc>
+                  <a:txBody>
+                    <a:bodyPr/>
+                    <a:lstStyle/>
+                    <a:p>
+                      <a:pPr marL="0" marR="0" indent="0" rtl="0" hangingPunct="0">
+                        <a:lnSpc>
+                          <a:spcPct val="100000"/>
+                        </a:lnSpc>
+                        <a:spcBef>
+                          <a:spcPts val="0"/>
+                        </a:spcBef>
+                        <a:spcAft>
+                          <a:spcPts val="0"/>
+                        </a:spcAft>
+                        <a:tabLst/>
+                      </a:pPr>
+                      <a:endParaRPr lang="en-US" sz="1800" b="0" i="0" u="none" strike="noStrike" kern="1200" cap="none" dirty="0">
+                        <a:ln>
+                          <a:noFill/>
+                        </a:ln>
+                        <a:latin typeface="Liberation Sans" pitchFamily="18"/>
+                      </a:endParaRPr>
+                    </a:p>
+                  </a:txBody>
+                  <a:tcPr/>
+                </a:tc>
+                <a:tc>
+                  <a:txBody>
+                    <a:bodyPr/>
+                    <a:lstStyle/>
+                    <a:p>
+                      <a:pPr marL="0" marR="0" indent="0" rtl="0" hangingPunct="0">
+                        <a:lnSpc>
+                          <a:spcPct val="100000"/>
+                        </a:lnSpc>
+                        <a:spcBef>
+                          <a:spcPts val="0"/>
+                        </a:spcBef>
+                        <a:spcAft>
+                          <a:spcPts val="0"/>
+                        </a:spcAft>
+                        <a:tabLst/>
+                      </a:pPr>
+                      <a:endParaRPr lang="en-US" sz="1800" b="0" i="0" u="none" strike="noStrike" kern="1200" cap="none" dirty="0">
+                        <a:ln>
+                          <a:noFill/>
+                        </a:ln>
+                        <a:latin typeface="Liberation Sans" pitchFamily="18"/>
+                      </a:endParaRPr>
+                    </a:p>
+                  </a:txBody>
+                  <a:tcPr/>
+                </a:tc>
+                <a:tc>
+                  <a:txBody>
+                    <a:bodyPr/>
+                    <a:lstStyle/>
+                    <a:p>
+                      <a:pPr marL="0" marR="0" indent="0" rtl="0" hangingPunct="0">
+                        <a:lnSpc>
+                          <a:spcPct val="100000"/>
+                        </a:lnSpc>
+                        <a:spcBef>
+                          <a:spcPts val="0"/>
+                        </a:spcBef>
+                        <a:spcAft>
+                          <a:spcPts val="0"/>
+                        </a:spcAft>
+                        <a:tabLst/>
+                      </a:pPr>
+                      <a:endParaRPr lang="en-US" sz="1800" b="0" i="0" u="none" strike="noStrike" kern="1200" cap="none" dirty="0">
+                        <a:ln>
+                          <a:noFill/>
+                        </a:ln>
+                        <a:latin typeface="Liberation Sans" pitchFamily="18"/>
+                      </a:endParaRPr>
+                    </a:p>
+                  </a:txBody>
+                  <a:tcPr/>
+                </a:tc>
+                <a:extLst>
+                  <a:ext uri="{0D108BD9-81ED-4DB2-BD59-A6C34878D82A}">
+                    <a16:rowId xmlns:a16="http://schemas.microsoft.com/office/drawing/2014/main" val="3619850477"/>
+                  </a:ext>
+                </a:extLst>
+              </a:tr>
+              <a:tr h="1156342">
+                <a:tc>
+                  <a:txBody>
+                    <a:bodyPr/>
+                    <a:lstStyle/>
+                    <a:p>
+                      <a:pPr marL="0" marR="0" lvl="0" indent="0" rtl="0" hangingPunct="0">
+                        <a:lnSpc>
+                          <a:spcPct val="100000"/>
+                        </a:lnSpc>
+                        <a:spcBef>
+                          <a:spcPts val="0"/>
+                        </a:spcBef>
+                        <a:spcAft>
+                          <a:spcPts val="0"/>
+                        </a:spcAft>
+                        <a:buNone/>
+                        <a:tabLst/>
+                        <a:defRPr sz="1800">
+                          <a:latin typeface="Liberation Sans" pitchFamily="34"/>
+                        </a:defRPr>
+                      </a:pPr>
+                      <a:r>
+                        <a:rPr lang="en-US" sz="1800" b="0" i="0" u="none" strike="noStrike" kern="1200" cap="none">
+                          <a:ln>
+                            <a:noFill/>
+                          </a:ln>
+                          <a:latin typeface="Liberation Sans" pitchFamily="34"/>
+                          <a:ea typeface="Noto Sans CJK SC" pitchFamily="2"/>
+                          <a:cs typeface="Lohit Devanagari" pitchFamily="2"/>
+                        </a:rPr>
+                        <a:t>Execution time</a:t>
+                      </a:r>
+                    </a:p>
+                  </a:txBody>
+                  <a:tcPr/>
+                </a:tc>
+                <a:tc>
+                  <a:txBody>
+                    <a:bodyPr/>
+                    <a:lstStyle/>
+                    <a:p>
+                      <a:pPr marL="0" marR="0" indent="0" rtl="0" hangingPunct="0">
+                        <a:lnSpc>
+                          <a:spcPct val="100000"/>
+                        </a:lnSpc>
+                        <a:spcBef>
+                          <a:spcPts val="0"/>
+                        </a:spcBef>
+                        <a:spcAft>
+                          <a:spcPts val="0"/>
+                        </a:spcAft>
+                        <a:tabLst/>
+                      </a:pPr>
+                      <a:endParaRPr lang="en-US" sz="1800" b="0" i="0" u="none" strike="noStrike" kern="1200" cap="none" dirty="0">
+                        <a:ln>
+                          <a:noFill/>
+                        </a:ln>
+                        <a:latin typeface="Liberation Sans" pitchFamily="18"/>
+                      </a:endParaRPr>
+                    </a:p>
+                  </a:txBody>
+                  <a:tcPr/>
+                </a:tc>
+                <a:tc>
+                  <a:txBody>
+                    <a:bodyPr/>
+                    <a:lstStyle/>
+                    <a:p>
+                      <a:pPr marL="0" marR="0" indent="0" rtl="0" hangingPunct="0">
+                        <a:lnSpc>
+                          <a:spcPct val="100000"/>
+                        </a:lnSpc>
+                        <a:spcBef>
+                          <a:spcPts val="0"/>
+                        </a:spcBef>
+                        <a:spcAft>
+                          <a:spcPts val="0"/>
+                        </a:spcAft>
+                        <a:tabLst/>
+                      </a:pPr>
+                      <a:endParaRPr lang="en-US" sz="1800" b="0" i="0" u="none" strike="noStrike" kern="1200" cap="none" dirty="0">
+                        <a:ln>
+                          <a:noFill/>
+                        </a:ln>
+                        <a:latin typeface="Liberation Sans" pitchFamily="18"/>
+                      </a:endParaRPr>
+                    </a:p>
+                  </a:txBody>
+                  <a:tcPr/>
+                </a:tc>
+                <a:tc>
+                  <a:txBody>
+                    <a:bodyPr/>
+                    <a:lstStyle/>
+                    <a:p>
+                      <a:pPr marL="0" marR="0" indent="0" rtl="0" hangingPunct="0">
+                        <a:lnSpc>
+                          <a:spcPct val="100000"/>
+                        </a:lnSpc>
+                        <a:spcBef>
+                          <a:spcPts val="0"/>
+                        </a:spcBef>
+                        <a:spcAft>
+                          <a:spcPts val="0"/>
+                        </a:spcAft>
+                        <a:tabLst/>
+                      </a:pPr>
+                      <a:endParaRPr lang="en-US" sz="1800" b="0" i="0" u="none" strike="noStrike" kern="1200" cap="none" dirty="0">
+                        <a:ln>
+                          <a:noFill/>
+                        </a:ln>
+                        <a:latin typeface="Liberation Sans" pitchFamily="18"/>
+                      </a:endParaRPr>
+                    </a:p>
+                  </a:txBody>
+                  <a:tcPr/>
+                </a:tc>
+                <a:tc>
+                  <a:txBody>
+                    <a:bodyPr/>
+                    <a:lstStyle/>
+                    <a:p>
+                      <a:pPr marL="0" marR="0" indent="0" rtl="0" hangingPunct="0">
+                        <a:lnSpc>
+                          <a:spcPct val="100000"/>
+                        </a:lnSpc>
+                        <a:spcBef>
+                          <a:spcPts val="0"/>
+                        </a:spcBef>
+                        <a:spcAft>
+                          <a:spcPts val="0"/>
+                        </a:spcAft>
+                        <a:tabLst/>
+                      </a:pPr>
+                      <a:endParaRPr lang="en-US" sz="1800" b="0" i="0" u="none" strike="noStrike" kern="1200" cap="none" dirty="0">
+                        <a:ln>
+                          <a:noFill/>
+                        </a:ln>
+                        <a:latin typeface="Liberation Sans" pitchFamily="18"/>
+                      </a:endParaRPr>
+                    </a:p>
+                  </a:txBody>
+                  <a:tcPr/>
+                </a:tc>
+                <a:tc>
+                  <a:txBody>
+                    <a:bodyPr/>
+                    <a:lstStyle/>
+                    <a:p>
+                      <a:pPr marL="0" marR="0" lvl="0" indent="0" rtl="0" hangingPunct="0">
+                        <a:lnSpc>
+                          <a:spcPct val="100000"/>
+                        </a:lnSpc>
+                        <a:spcBef>
+                          <a:spcPts val="0"/>
+                        </a:spcBef>
+                        <a:spcAft>
+                          <a:spcPts val="0"/>
+                        </a:spcAft>
+                        <a:buNone/>
+                        <a:tabLst/>
+                        <a:defRPr sz="1800">
+                          <a:latin typeface="Liberation Sans" pitchFamily="34"/>
+                        </a:defRPr>
+                      </a:pPr>
+                      <a:endParaRPr lang="en-US" sz="1800" b="0" i="0" u="none" strike="noStrike" kern="1200" cap="none" dirty="0">
+                        <a:ln>
+                          <a:noFill/>
+                        </a:ln>
+                        <a:latin typeface="Liberation Sans" pitchFamily="34"/>
+                        <a:ea typeface="Noto Sans CJK SC" pitchFamily="2"/>
+                        <a:cs typeface="Lohit Devanagari" pitchFamily="2"/>
+                      </a:endParaRPr>
+                    </a:p>
+                  </a:txBody>
+                  <a:tcPr/>
+                </a:tc>
+                <a:extLst>
+                  <a:ext uri="{0D108BD9-81ED-4DB2-BD59-A6C34878D82A}">
+                    <a16:rowId xmlns:a16="http://schemas.microsoft.com/office/drawing/2014/main" val="3690084186"/>
+                  </a:ext>
+                </a:extLst>
+              </a:tr>
+            </a:tbl>
+          </a:graphicData>
+        </a:graphic>
+      </p:graphicFrame>
+    </p:spTree>
+    <p:extLst>
+      <p:ext uri="{BB962C8B-B14F-4D97-AF65-F5344CB8AC3E}">
+        <p14:creationId xmlns:p14="http://schemas.microsoft.com/office/powerpoint/2010/main" val="4215836679"/>
+      </p:ext>
+    </p:extLst>
+  </p:cSld>
+  <p:clrMapOvr>
+    <a:masterClrMapping/>
+  </p:clrMapOvr>
+</p:sld>
+</file>
+
+<file path=ppt/slides/slide3.xml><?xml version="1.0" encoding="utf-8"?>
+<p:sld xmlns:a="http://schemas.openxmlformats.org/drawingml/2006/main" xmlns:r="http://schemas.openxmlformats.org/officeDocument/2006/relationships" xmlns:p="http://schemas.openxmlformats.org/presentationml/2006/main">
+  <p:cSld>
+    <p:spTree>
+      <p:nvGrpSpPr>
+        <p:cNvPr id="1" name=""/>
+        <p:cNvGrpSpPr/>
+        <p:nvPr/>
+      </p:nvGrpSpPr>
+      <p:grpSpPr>
+        <a:xfrm>
+          <a:off x="0" y="0"/>
+          <a:ext cx="0" cy="0"/>
+          <a:chOff x="0" y="0"/>
+          <a:chExt cx="0" cy="0"/>
+        </a:xfrm>
+      </p:grpSpPr>
+      <p:sp>
+        <p:nvSpPr>
+          <p:cNvPr id="2" name="Title 1">
+            <a:extLst>
+              <a:ext uri="{FF2B5EF4-FFF2-40B4-BE49-F238E27FC236}">
+                <a16:creationId xmlns:a16="http://schemas.microsoft.com/office/drawing/2014/main" id="{0BBA1E42-504A-4394-9885-44ACD2FD632B}"/>
+              </a:ext>
+            </a:extLst>
+          </p:cNvPr>
+          <p:cNvSpPr txBox="1">
+            <a:spLocks noGrp="1"/>
+          </p:cNvSpPr>
+          <p:nvPr>
+            <p:ph type="title" idx="4294967295"/>
+          </p:nvPr>
+        </p:nvSpPr>
+        <p:spPr>
+          <a:xfrm>
+            <a:off x="410215" y="0"/>
+            <a:ext cx="9581848" cy="891136"/>
+          </a:xfrm>
+        </p:spPr>
+        <p:txBody>
+          <a:bodyPr vert="horz"/>
+          <a:lstStyle/>
+          <a:p>
+            <a:pPr lvl="0"/>
+            <a:r>
+              <a:rPr lang="en-US" sz="2000" dirty="0"/>
+              <a:t>Quick Comparison on Yahoo A4 Benchmark Dataset – 100 Time Series</a:t>
+            </a:r>
+          </a:p>
+        </p:txBody>
+      </p:sp>
+      <p:graphicFrame>
+        <p:nvGraphicFramePr>
+          <p:cNvPr id="4" name="Table 3">
+            <a:extLst>
+              <a:ext uri="{FF2B5EF4-FFF2-40B4-BE49-F238E27FC236}">
+                <a16:creationId xmlns:a16="http://schemas.microsoft.com/office/drawing/2014/main" id="{A47452BE-25FD-4945-B15C-7AB50AB45EC8}"/>
+              </a:ext>
+            </a:extLst>
+          </p:cNvPr>
+          <p:cNvGraphicFramePr>
+            <a:graphicFrameLocks noGrp="1"/>
+          </p:cNvGraphicFramePr>
+          <p:nvPr/>
+        </p:nvGraphicFramePr>
+        <p:xfrm>
+          <a:off x="410214" y="891136"/>
+          <a:ext cx="9035444" cy="4503429"/>
+        </p:xfrm>
+        <a:graphic>
+          <a:graphicData uri="http://schemas.openxmlformats.org/drawingml/2006/table">
+            <a:tbl>
+              <a:tblPr firstRow="1" bandRow="1">
+                <a:tableStyleId>{E238C490-6FC5-45BF-8602-39B36D2FA802}</a:tableStyleId>
+              </a:tblPr>
+              <a:tblGrid>
+                <a:gridCol w="1709039">
+                  <a:extLst>
+                    <a:ext uri="{9D8B030D-6E8A-4147-A177-3AD203B41FA5}">
+                      <a16:colId xmlns:a16="http://schemas.microsoft.com/office/drawing/2014/main" val="549638599"/>
+                    </a:ext>
+                  </a:extLst>
+                </a:gridCol>
+                <a:gridCol w="1299989">
+                  <a:extLst>
+                    <a:ext uri="{9D8B030D-6E8A-4147-A177-3AD203B41FA5}">
+                      <a16:colId xmlns:a16="http://schemas.microsoft.com/office/drawing/2014/main" val="388096317"/>
+                    </a:ext>
+                  </a:extLst>
+                </a:gridCol>
+                <a:gridCol w="1504514">
+                  <a:extLst>
+                    <a:ext uri="{9D8B030D-6E8A-4147-A177-3AD203B41FA5}">
+                      <a16:colId xmlns:a16="http://schemas.microsoft.com/office/drawing/2014/main" val="2056048235"/>
+                    </a:ext>
+                  </a:extLst>
+                </a:gridCol>
+                <a:gridCol w="1504514">
+                  <a:extLst>
+                    <a:ext uri="{9D8B030D-6E8A-4147-A177-3AD203B41FA5}">
+                      <a16:colId xmlns:a16="http://schemas.microsoft.com/office/drawing/2014/main" val="2653049669"/>
+                    </a:ext>
+                  </a:extLst>
+                </a:gridCol>
+                <a:gridCol w="1508694">
+                  <a:extLst>
+                    <a:ext uri="{9D8B030D-6E8A-4147-A177-3AD203B41FA5}">
+                      <a16:colId xmlns:a16="http://schemas.microsoft.com/office/drawing/2014/main" val="2807278400"/>
+                    </a:ext>
+                  </a:extLst>
+                </a:gridCol>
+                <a:gridCol w="1508694">
+                  <a:extLst>
+                    <a:ext uri="{9D8B030D-6E8A-4147-A177-3AD203B41FA5}">
+                      <a16:colId xmlns:a16="http://schemas.microsoft.com/office/drawing/2014/main" val="3910885709"/>
+                    </a:ext>
+                  </a:extLst>
+                </a:gridCol>
+              </a:tblGrid>
+              <a:tr h="889494">
+                <a:tc>
+                  <a:txBody>
+                    <a:bodyPr/>
+                    <a:lstStyle/>
+                    <a:p>
+                      <a:pPr marL="0" marR="0" lvl="0" indent="0" rtl="0" hangingPunct="0">
+                        <a:lnSpc>
+                          <a:spcPct val="100000"/>
+                        </a:lnSpc>
+                        <a:spcBef>
+                          <a:spcPts val="0"/>
+                        </a:spcBef>
+                        <a:spcAft>
+                          <a:spcPts val="0"/>
+                        </a:spcAft>
+                        <a:buNone/>
+                        <a:tabLst/>
+                      </a:pPr>
+                      <a:r>
+                        <a:rPr lang="en-US" sz="1800" b="0" i="0" u="none" strike="noStrike" kern="1200" cap="none" dirty="0">
+                          <a:ln>
+                            <a:noFill/>
+                          </a:ln>
+                          <a:latin typeface="Liberation Sans" pitchFamily="34"/>
+                          <a:ea typeface="Noto Sans CJK SC" pitchFamily="2"/>
+                          <a:cs typeface="Lohit Devanagari" pitchFamily="2"/>
+                        </a:rPr>
+                        <a:t>Metric\Model</a:t>
+                      </a:r>
+                    </a:p>
+                  </a:txBody>
+                  <a:tcPr/>
+                </a:tc>
+                <a:tc>
+                  <a:txBody>
+                    <a:bodyPr/>
+                    <a:lstStyle/>
+                    <a:p>
+                      <a:pPr marL="0" marR="0" lvl="0" indent="0" rtl="0" hangingPunct="0">
+                        <a:lnSpc>
+                          <a:spcPct val="100000"/>
+                        </a:lnSpc>
+                        <a:spcBef>
+                          <a:spcPts val="0"/>
+                        </a:spcBef>
+                        <a:spcAft>
+                          <a:spcPts val="0"/>
+                        </a:spcAft>
+                        <a:buNone/>
+                        <a:tabLst/>
+                        <a:defRPr sz="1800">
+                          <a:latin typeface="Liberation Sans" pitchFamily="34"/>
+                        </a:defRPr>
+                      </a:pPr>
+                      <a:r>
+                        <a:rPr lang="en-US" sz="1800" b="0" i="0" u="none" strike="noStrike" kern="1200" cap="none">
+                          <a:ln>
+                            <a:noFill/>
+                          </a:ln>
+                          <a:latin typeface="Liberation Sans" pitchFamily="34"/>
+                          <a:ea typeface="Noto Sans CJK SC" pitchFamily="2"/>
+                          <a:cs typeface="Lohit Devanagari" pitchFamily="2"/>
+                        </a:rPr>
+                        <a:t>AR</a:t>
+                      </a:r>
+                    </a:p>
+                  </a:txBody>
+                  <a:tcPr/>
+                </a:tc>
+                <a:tc>
+                  <a:txBody>
+                    <a:bodyPr/>
+                    <a:lstStyle/>
+                    <a:p>
+                      <a:pPr marL="0" marR="0" lvl="0" indent="0" rtl="0" hangingPunct="0">
+                        <a:lnSpc>
+                          <a:spcPct val="100000"/>
+                        </a:lnSpc>
+                        <a:spcBef>
+                          <a:spcPts val="0"/>
+                        </a:spcBef>
+                        <a:spcAft>
+                          <a:spcPts val="0"/>
+                        </a:spcAft>
+                        <a:buNone/>
+                        <a:tabLst/>
+                        <a:defRPr sz="1800">
+                          <a:latin typeface="Liberation Sans" pitchFamily="34"/>
+                        </a:defRPr>
+                      </a:pPr>
+                      <a:r>
+                        <a:rPr lang="en-US" sz="1800" b="0" i="0" u="none" strike="noStrike" kern="1200" cap="none" dirty="0">
+                          <a:ln>
+                            <a:noFill/>
+                          </a:ln>
+                          <a:latin typeface="Liberation Sans" pitchFamily="34"/>
+                          <a:ea typeface="Noto Sans CJK SC" pitchFamily="2"/>
+                          <a:cs typeface="Lohit Devanagari" pitchFamily="2"/>
+                        </a:rPr>
+                        <a:t>MA</a:t>
+                      </a:r>
+                    </a:p>
+                  </a:txBody>
+                  <a:tcPr/>
+                </a:tc>
+                <a:tc>
+                  <a:txBody>
+                    <a:bodyPr/>
+                    <a:lstStyle/>
+                    <a:p>
+                      <a:pPr marL="0" marR="0" lvl="0" indent="0" rtl="0" hangingPunct="0">
+                        <a:lnSpc>
+                          <a:spcPct val="100000"/>
+                        </a:lnSpc>
+                        <a:spcBef>
+                          <a:spcPts val="0"/>
+                        </a:spcBef>
+                        <a:spcAft>
+                          <a:spcPts val="0"/>
+                        </a:spcAft>
+                        <a:buNone/>
+                        <a:tabLst/>
+                        <a:defRPr sz="1800">
+                          <a:latin typeface="Liberation Sans" pitchFamily="34"/>
+                        </a:defRPr>
+                      </a:pPr>
+                      <a:r>
+                        <a:rPr lang="en-US" sz="1800" b="0" i="0" u="none" strike="noStrike" kern="1200" cap="none">
+                          <a:ln>
+                            <a:noFill/>
+                          </a:ln>
+                          <a:latin typeface="Liberation Sans" pitchFamily="34"/>
+                          <a:ea typeface="Noto Sans CJK SC" pitchFamily="2"/>
+                          <a:cs typeface="Lohit Devanagari" pitchFamily="2"/>
+                        </a:rPr>
+                        <a:t>ARIMA</a:t>
+                      </a:r>
+                    </a:p>
+                  </a:txBody>
+                  <a:tcPr/>
+                </a:tc>
+                <a:tc>
+                  <a:txBody>
+                    <a:bodyPr/>
+                    <a:lstStyle/>
+                    <a:p>
+                      <a:pPr marL="0" marR="0" lvl="0" indent="0" rtl="0" hangingPunct="0">
+                        <a:lnSpc>
+                          <a:spcPct val="100000"/>
+                        </a:lnSpc>
+                        <a:spcBef>
+                          <a:spcPts val="0"/>
+                        </a:spcBef>
+                        <a:spcAft>
+                          <a:spcPts val="0"/>
+                        </a:spcAft>
+                        <a:buNone/>
+                        <a:tabLst/>
+                        <a:defRPr sz="1800">
+                          <a:latin typeface="Liberation Sans" pitchFamily="34"/>
+                        </a:defRPr>
+                      </a:pPr>
+                      <a:r>
+                        <a:rPr lang="en-US" sz="1800" b="0" i="0" u="none" strike="noStrike" kern="1200" cap="none" dirty="0">
+                          <a:ln>
+                            <a:noFill/>
+                          </a:ln>
+                          <a:latin typeface="Liberation Sans" pitchFamily="34"/>
+                          <a:ea typeface="Noto Sans CJK SC" pitchFamily="2"/>
+                          <a:cs typeface="Lohit Devanagari" pitchFamily="2"/>
+                        </a:rPr>
+                        <a:t>STL</a:t>
+                      </a:r>
+                    </a:p>
+                  </a:txBody>
+                  <a:tcPr/>
+                </a:tc>
+                <a:tc>
+                  <a:txBody>
+                    <a:bodyPr/>
+                    <a:lstStyle/>
+                    <a:p>
+                      <a:pPr marL="0" marR="0" lvl="0" indent="0" rtl="0" hangingPunct="0">
+                        <a:lnSpc>
+                          <a:spcPct val="100000"/>
+                        </a:lnSpc>
+                        <a:spcBef>
+                          <a:spcPts val="0"/>
+                        </a:spcBef>
+                        <a:spcAft>
+                          <a:spcPts val="0"/>
+                        </a:spcAft>
+                        <a:buNone/>
+                        <a:tabLst/>
+                        <a:defRPr sz="1800">
+                          <a:latin typeface="Liberation Sans" pitchFamily="34"/>
+                        </a:defRPr>
+                      </a:pPr>
+                      <a:r>
+                        <a:rPr lang="en-US" sz="1800" b="0" i="0" u="none" strike="noStrike" kern="1200" cap="none" dirty="0">
+                          <a:ln>
+                            <a:noFill/>
+                          </a:ln>
+                          <a:latin typeface="Liberation Sans" pitchFamily="34"/>
+                          <a:ea typeface="Noto Sans CJK SC" pitchFamily="2"/>
+                          <a:cs typeface="Lohit Devanagari" pitchFamily="2"/>
+                        </a:rPr>
+                        <a:t>HW</a:t>
+                      </a:r>
+                    </a:p>
+                  </a:txBody>
+                  <a:tcPr/>
+                </a:tc>
+                <a:extLst>
+                  <a:ext uri="{0D108BD9-81ED-4DB2-BD59-A6C34878D82A}">
+                    <a16:rowId xmlns:a16="http://schemas.microsoft.com/office/drawing/2014/main" val="426170887"/>
+                  </a:ext>
+                </a:extLst>
+              </a:tr>
+              <a:tr h="889494">
+                <a:tc>
+                  <a:txBody>
+                    <a:bodyPr/>
+                    <a:lstStyle/>
+                    <a:p>
+                      <a:pPr marL="0" marR="0" lvl="0" indent="0" rtl="0" hangingPunct="0">
+                        <a:lnSpc>
+                          <a:spcPct val="100000"/>
+                        </a:lnSpc>
+                        <a:spcBef>
+                          <a:spcPts val="0"/>
+                        </a:spcBef>
+                        <a:spcAft>
+                          <a:spcPts val="0"/>
+                        </a:spcAft>
+                        <a:buNone/>
+                        <a:tabLst/>
+                        <a:defRPr sz="1800">
+                          <a:latin typeface="Liberation Sans" pitchFamily="34"/>
+                        </a:defRPr>
+                      </a:pPr>
+                      <a:r>
+                        <a:rPr lang="en-US" sz="1800" b="0" i="0" u="none" strike="noStrike" kern="1200" cap="none" dirty="0">
+                          <a:ln>
+                            <a:noFill/>
+                          </a:ln>
+                          <a:latin typeface="Liberation Sans" pitchFamily="34"/>
+                          <a:ea typeface="Noto Sans CJK SC" pitchFamily="2"/>
+                          <a:cs typeface="Lohit Devanagari" pitchFamily="2"/>
+                        </a:rPr>
+                        <a:t>Avg F1</a:t>
+                      </a:r>
+                    </a:p>
+                  </a:txBody>
+                  <a:tcPr/>
+                </a:tc>
+                <a:tc>
+                  <a:txBody>
+                    <a:bodyPr/>
+                    <a:lstStyle/>
+                    <a:p>
+                      <a:pPr marL="0" marR="0" indent="0" rtl="0" hangingPunct="0">
+                        <a:lnSpc>
+                          <a:spcPct val="100000"/>
+                        </a:lnSpc>
+                        <a:spcBef>
+                          <a:spcPts val="0"/>
+                        </a:spcBef>
+                        <a:spcAft>
+                          <a:spcPts val="0"/>
+                        </a:spcAft>
+                        <a:tabLst/>
+                      </a:pPr>
+                      <a:endParaRPr lang="en-US" sz="1800" b="0" i="0" u="none" strike="noStrike" kern="1200" cap="none" dirty="0">
+                        <a:ln>
+                          <a:noFill/>
+                        </a:ln>
+                        <a:latin typeface="Liberation Sans" pitchFamily="18"/>
+                      </a:endParaRPr>
+                    </a:p>
+                  </a:txBody>
+                  <a:tcPr/>
+                </a:tc>
+                <a:tc>
+                  <a:txBody>
+                    <a:bodyPr/>
+                    <a:lstStyle/>
+                    <a:p>
+                      <a:pPr marL="0" marR="0" indent="0" rtl="0" hangingPunct="0">
+                        <a:lnSpc>
+                          <a:spcPct val="100000"/>
+                        </a:lnSpc>
+                        <a:spcBef>
+                          <a:spcPts val="0"/>
+                        </a:spcBef>
+                        <a:spcAft>
+                          <a:spcPts val="0"/>
+                        </a:spcAft>
+                        <a:tabLst/>
+                      </a:pPr>
+                      <a:endParaRPr lang="en-US" sz="1800" b="0" i="0" u="none" strike="noStrike" kern="1200" cap="none" dirty="0">
+                        <a:ln>
+                          <a:noFill/>
+                        </a:ln>
+                        <a:latin typeface="Liberation Sans" pitchFamily="18"/>
+                      </a:endParaRPr>
+                    </a:p>
+                  </a:txBody>
+                  <a:tcPr/>
+                </a:tc>
+                <a:tc>
+                  <a:txBody>
+                    <a:bodyPr/>
+                    <a:lstStyle/>
+                    <a:p>
+                      <a:pPr marL="0" marR="0" indent="0" rtl="0" hangingPunct="0">
+                        <a:lnSpc>
+                          <a:spcPct val="100000"/>
+                        </a:lnSpc>
+                        <a:spcBef>
+                          <a:spcPts val="0"/>
+                        </a:spcBef>
+                        <a:spcAft>
+                          <a:spcPts val="0"/>
+                        </a:spcAft>
+                        <a:tabLst/>
+                      </a:pPr>
+                      <a:endParaRPr lang="en-US" sz="1800" b="0" i="0" u="none" strike="noStrike" kern="1200" cap="none" dirty="0">
+                        <a:ln>
+                          <a:noFill/>
+                        </a:ln>
+                        <a:latin typeface="Liberation Sans" pitchFamily="18"/>
+                      </a:endParaRPr>
+                    </a:p>
+                  </a:txBody>
+                  <a:tcPr/>
+                </a:tc>
+                <a:tc>
+                  <a:txBody>
+                    <a:bodyPr/>
+                    <a:lstStyle/>
+                    <a:p>
+                      <a:pPr marL="0" marR="0" indent="0" rtl="0" hangingPunct="0">
+                        <a:lnSpc>
+                          <a:spcPct val="100000"/>
+                        </a:lnSpc>
+                        <a:spcBef>
+                          <a:spcPts val="0"/>
+                        </a:spcBef>
+                        <a:spcAft>
+                          <a:spcPts val="0"/>
+                        </a:spcAft>
+                        <a:tabLst/>
+                      </a:pPr>
+                      <a:endParaRPr lang="en-US" sz="1800" b="0" i="0" u="none" strike="noStrike" kern="1200" cap="none" dirty="0">
+                        <a:ln>
+                          <a:noFill/>
+                        </a:ln>
+                        <a:latin typeface="Liberation Sans" pitchFamily="18"/>
+                      </a:endParaRPr>
+                    </a:p>
+                  </a:txBody>
+                  <a:tcPr/>
+                </a:tc>
+                <a:tc>
+                  <a:txBody>
+                    <a:bodyPr/>
+                    <a:lstStyle/>
+                    <a:p>
+                      <a:pPr marL="0" marR="0" lvl="0" indent="0" rtl="0" hangingPunct="0">
+                        <a:lnSpc>
+                          <a:spcPct val="100000"/>
+                        </a:lnSpc>
+                        <a:spcBef>
+                          <a:spcPts val="0"/>
+                        </a:spcBef>
+                        <a:spcAft>
+                          <a:spcPts val="0"/>
+                        </a:spcAft>
+                        <a:buNone/>
+                        <a:tabLst/>
+                        <a:defRPr sz="1800">
+                          <a:latin typeface="Liberation Sans" pitchFamily="34"/>
+                        </a:defRPr>
+                      </a:pPr>
+                      <a:endParaRPr lang="en-US" sz="1800" b="0" i="0" u="none" strike="noStrike" kern="1200" cap="none" dirty="0">
+                        <a:ln>
+                          <a:noFill/>
+                        </a:ln>
+                        <a:latin typeface="Liberation Sans" pitchFamily="34"/>
+                        <a:ea typeface="Noto Sans CJK SC" pitchFamily="2"/>
+                        <a:cs typeface="Lohit Devanagari" pitchFamily="2"/>
+                      </a:endParaRPr>
+                    </a:p>
+                  </a:txBody>
+                  <a:tcPr/>
+                </a:tc>
+                <a:extLst>
+                  <a:ext uri="{0D108BD9-81ED-4DB2-BD59-A6C34878D82A}">
+                    <a16:rowId xmlns:a16="http://schemas.microsoft.com/office/drawing/2014/main" val="1668712776"/>
+                  </a:ext>
+                </a:extLst>
+              </a:tr>
+              <a:tr h="889494">
+                <a:tc>
+                  <a:txBody>
+                    <a:bodyPr/>
+                    <a:lstStyle/>
+                    <a:p>
+                      <a:pPr marL="0" marR="0" lvl="0" indent="0" rtl="0" hangingPunct="0">
+                        <a:lnSpc>
+                          <a:spcPct val="100000"/>
+                        </a:lnSpc>
+                        <a:spcBef>
+                          <a:spcPts val="0"/>
+                        </a:spcBef>
+                        <a:spcAft>
+                          <a:spcPts val="0"/>
+                        </a:spcAft>
+                        <a:buNone/>
+                        <a:tabLst/>
+                        <a:defRPr sz="1800">
+                          <a:latin typeface="Liberation Sans" pitchFamily="34"/>
+                        </a:defRPr>
+                      </a:pPr>
+                      <a:r>
+                        <a:rPr lang="en-US" sz="1800" b="0" i="0" u="none" strike="noStrike" kern="1200" cap="none">
+                          <a:ln>
+                            <a:noFill/>
+                          </a:ln>
+                          <a:latin typeface="Liberation Sans" pitchFamily="34"/>
+                          <a:ea typeface="Noto Sans CJK SC" pitchFamily="2"/>
+                          <a:cs typeface="Lohit Devanagari" pitchFamily="2"/>
+                        </a:rPr>
+                        <a:t>Avg Precision</a:t>
+                      </a:r>
+                    </a:p>
+                  </a:txBody>
+                  <a:tcPr/>
+                </a:tc>
+                <a:tc>
+                  <a:txBody>
+                    <a:bodyPr/>
+                    <a:lstStyle/>
+                    <a:p>
+                      <a:pPr marL="0" marR="0" indent="0" rtl="0" hangingPunct="0">
+                        <a:lnSpc>
+                          <a:spcPct val="100000"/>
+                        </a:lnSpc>
+                        <a:spcBef>
+                          <a:spcPts val="0"/>
+                        </a:spcBef>
+                        <a:spcAft>
+                          <a:spcPts val="0"/>
+                        </a:spcAft>
+                        <a:tabLst/>
+                      </a:pPr>
+                      <a:endParaRPr lang="en-US" sz="1800" b="0" i="0" u="none" strike="noStrike" kern="1200" cap="none" dirty="0">
+                        <a:ln>
+                          <a:noFill/>
+                        </a:ln>
+                        <a:latin typeface="Liberation Sans" pitchFamily="18"/>
+                      </a:endParaRPr>
+                    </a:p>
+                  </a:txBody>
+                  <a:tcPr/>
+                </a:tc>
+                <a:tc>
+                  <a:txBody>
+                    <a:bodyPr/>
+                    <a:lstStyle/>
+                    <a:p>
+                      <a:pPr marL="0" marR="0" indent="0" rtl="0" hangingPunct="0">
+                        <a:lnSpc>
+                          <a:spcPct val="100000"/>
+                        </a:lnSpc>
+                        <a:spcBef>
+                          <a:spcPts val="0"/>
+                        </a:spcBef>
+                        <a:spcAft>
+                          <a:spcPts val="0"/>
+                        </a:spcAft>
+                        <a:tabLst/>
+                      </a:pPr>
+                      <a:endParaRPr lang="en-US" sz="1800" b="0" i="0" u="none" strike="noStrike" kern="1200" cap="none" dirty="0">
+                        <a:ln>
+                          <a:noFill/>
+                        </a:ln>
+                        <a:latin typeface="Liberation Sans" pitchFamily="18"/>
+                      </a:endParaRPr>
+                    </a:p>
+                  </a:txBody>
+                  <a:tcPr/>
+                </a:tc>
+                <a:tc>
+                  <a:txBody>
+                    <a:bodyPr/>
+                    <a:lstStyle/>
+                    <a:p>
+                      <a:pPr marL="0" marR="0" indent="0" rtl="0" hangingPunct="0">
+                        <a:lnSpc>
+                          <a:spcPct val="100000"/>
+                        </a:lnSpc>
+                        <a:spcBef>
+                          <a:spcPts val="0"/>
+                        </a:spcBef>
+                        <a:spcAft>
+                          <a:spcPts val="0"/>
+                        </a:spcAft>
+                        <a:tabLst/>
+                      </a:pPr>
+                      <a:endParaRPr lang="en-US" sz="1800" b="0" i="0" u="none" strike="noStrike" kern="1200" cap="none" dirty="0">
+                        <a:ln>
+                          <a:noFill/>
+                        </a:ln>
+                        <a:latin typeface="Liberation Sans" pitchFamily="18"/>
+                      </a:endParaRPr>
+                    </a:p>
+                  </a:txBody>
+                  <a:tcPr/>
+                </a:tc>
+                <a:tc>
+                  <a:txBody>
+                    <a:bodyPr/>
+                    <a:lstStyle/>
+                    <a:p>
+                      <a:pPr marL="0" marR="0" indent="0" rtl="0" hangingPunct="0">
+                        <a:lnSpc>
+                          <a:spcPct val="100000"/>
+                        </a:lnSpc>
+                        <a:spcBef>
+                          <a:spcPts val="0"/>
+                        </a:spcBef>
+                        <a:spcAft>
+                          <a:spcPts val="0"/>
+                        </a:spcAft>
+                        <a:tabLst/>
+                      </a:pPr>
+                      <a:endParaRPr lang="en-US" sz="1800" b="0" i="0" u="none" strike="noStrike" kern="1200" cap="none" dirty="0">
+                        <a:ln>
+                          <a:noFill/>
+                        </a:ln>
+                        <a:latin typeface="Liberation Sans" pitchFamily="18"/>
+                      </a:endParaRPr>
+                    </a:p>
+                  </a:txBody>
+                  <a:tcPr/>
+                </a:tc>
+                <a:tc>
+                  <a:txBody>
+                    <a:bodyPr/>
+                    <a:lstStyle/>
+                    <a:p>
+                      <a:pPr marL="0" marR="0" indent="0" rtl="0" hangingPunct="0">
+                        <a:lnSpc>
+                          <a:spcPct val="100000"/>
+                        </a:lnSpc>
+                        <a:spcBef>
+                          <a:spcPts val="0"/>
+                        </a:spcBef>
+                        <a:spcAft>
+                          <a:spcPts val="0"/>
+                        </a:spcAft>
+                        <a:tabLst/>
+                      </a:pPr>
+                      <a:endParaRPr lang="en-US" sz="1800" b="0" i="0" u="none" strike="noStrike" kern="1200" cap="none" dirty="0">
+                        <a:ln>
+                          <a:noFill/>
+                        </a:ln>
+                        <a:latin typeface="Liberation Sans" pitchFamily="18"/>
+                      </a:endParaRPr>
+                    </a:p>
+                  </a:txBody>
+                  <a:tcPr/>
+                </a:tc>
+                <a:extLst>
+                  <a:ext uri="{0D108BD9-81ED-4DB2-BD59-A6C34878D82A}">
+                    <a16:rowId xmlns:a16="http://schemas.microsoft.com/office/drawing/2014/main" val="2522885085"/>
+                  </a:ext>
+                </a:extLst>
+              </a:tr>
+              <a:tr h="678605">
+                <a:tc>
+                  <a:txBody>
+                    <a:bodyPr/>
+                    <a:lstStyle/>
+                    <a:p>
+                      <a:pPr marL="0" marR="0" lvl="0" indent="0" rtl="0" hangingPunct="0">
+                        <a:lnSpc>
+                          <a:spcPct val="100000"/>
+                        </a:lnSpc>
+                        <a:spcBef>
+                          <a:spcPts val="0"/>
+                        </a:spcBef>
+                        <a:spcAft>
+                          <a:spcPts val="0"/>
+                        </a:spcAft>
+                        <a:buNone/>
+                        <a:tabLst/>
+                        <a:defRPr sz="1800">
+                          <a:latin typeface="Liberation Sans" pitchFamily="34"/>
+                        </a:defRPr>
+                      </a:pPr>
+                      <a:r>
+                        <a:rPr lang="en-US" sz="1800" b="0" i="0" u="none" strike="noStrike" kern="1200" cap="none">
+                          <a:ln>
+                            <a:noFill/>
+                          </a:ln>
+                          <a:latin typeface="Liberation Sans" pitchFamily="34"/>
+                          <a:ea typeface="Noto Sans CJK SC" pitchFamily="2"/>
+                          <a:cs typeface="Lohit Devanagari" pitchFamily="2"/>
+                        </a:rPr>
+                        <a:t>Avg Recall</a:t>
+                      </a:r>
+                    </a:p>
+                  </a:txBody>
+                  <a:tcPr/>
+                </a:tc>
+                <a:tc>
+                  <a:txBody>
+                    <a:bodyPr/>
+                    <a:lstStyle/>
+                    <a:p>
+                      <a:pPr marL="0" marR="0" indent="0" rtl="0" hangingPunct="0">
+                        <a:lnSpc>
+                          <a:spcPct val="100000"/>
+                        </a:lnSpc>
+                        <a:spcBef>
+                          <a:spcPts val="0"/>
+                        </a:spcBef>
+                        <a:spcAft>
+                          <a:spcPts val="0"/>
+                        </a:spcAft>
+                        <a:tabLst/>
+                      </a:pPr>
+                      <a:endParaRPr lang="en-US" sz="1800" b="0" i="0" u="none" strike="noStrike" kern="1200" cap="none" dirty="0">
+                        <a:ln>
+                          <a:noFill/>
+                        </a:ln>
+                        <a:latin typeface="Liberation Sans" pitchFamily="18"/>
+                      </a:endParaRPr>
+                    </a:p>
+                  </a:txBody>
+                  <a:tcPr/>
+                </a:tc>
+                <a:tc>
+                  <a:txBody>
+                    <a:bodyPr/>
+                    <a:lstStyle/>
+                    <a:p>
+                      <a:pPr marL="0" marR="0" indent="0" rtl="0" hangingPunct="0">
+                        <a:lnSpc>
+                          <a:spcPct val="100000"/>
+                        </a:lnSpc>
+                        <a:spcBef>
+                          <a:spcPts val="0"/>
+                        </a:spcBef>
+                        <a:spcAft>
+                          <a:spcPts val="0"/>
+                        </a:spcAft>
+                        <a:tabLst/>
+                      </a:pPr>
+                      <a:endParaRPr lang="en-US" sz="1800" b="0" i="0" u="none" strike="noStrike" kern="1200" cap="none" dirty="0">
+                        <a:ln>
+                          <a:noFill/>
+                        </a:ln>
+                        <a:latin typeface="Liberation Sans" pitchFamily="18"/>
+                      </a:endParaRPr>
+                    </a:p>
+                  </a:txBody>
+                  <a:tcPr/>
+                </a:tc>
+                <a:tc>
+                  <a:txBody>
+                    <a:bodyPr/>
+                    <a:lstStyle/>
+                    <a:p>
+                      <a:pPr marL="0" marR="0" indent="0" rtl="0" hangingPunct="0">
+                        <a:lnSpc>
+                          <a:spcPct val="100000"/>
+                        </a:lnSpc>
+                        <a:spcBef>
+                          <a:spcPts val="0"/>
+                        </a:spcBef>
+                        <a:spcAft>
+                          <a:spcPts val="0"/>
+                        </a:spcAft>
+                        <a:tabLst/>
+                      </a:pPr>
+                      <a:endParaRPr lang="en-US" sz="1800" b="0" i="0" u="none" strike="noStrike" kern="1200" cap="none" dirty="0">
+                        <a:ln>
+                          <a:noFill/>
+                        </a:ln>
+                        <a:latin typeface="Liberation Sans" pitchFamily="18"/>
+                      </a:endParaRPr>
+                    </a:p>
+                  </a:txBody>
+                  <a:tcPr/>
+                </a:tc>
+                <a:tc>
+                  <a:txBody>
+                    <a:bodyPr/>
+                    <a:lstStyle/>
+                    <a:p>
+                      <a:pPr marL="0" marR="0" indent="0" rtl="0" hangingPunct="0">
+                        <a:lnSpc>
+                          <a:spcPct val="100000"/>
+                        </a:lnSpc>
+                        <a:spcBef>
+                          <a:spcPts val="0"/>
+                        </a:spcBef>
+                        <a:spcAft>
+                          <a:spcPts val="0"/>
+                        </a:spcAft>
+                        <a:tabLst/>
+                      </a:pPr>
+                      <a:endParaRPr lang="en-US" sz="1800" b="0" i="0" u="none" strike="noStrike" kern="1200" cap="none" dirty="0">
+                        <a:ln>
+                          <a:noFill/>
+                        </a:ln>
+                        <a:latin typeface="Liberation Sans" pitchFamily="18"/>
+                      </a:endParaRPr>
+                    </a:p>
+                  </a:txBody>
+                  <a:tcPr/>
+                </a:tc>
+                <a:tc>
+                  <a:txBody>
+                    <a:bodyPr/>
+                    <a:lstStyle/>
+                    <a:p>
+                      <a:pPr marL="0" marR="0" indent="0" rtl="0" hangingPunct="0">
+                        <a:lnSpc>
+                          <a:spcPct val="100000"/>
+                        </a:lnSpc>
+                        <a:spcBef>
+                          <a:spcPts val="0"/>
+                        </a:spcBef>
+                        <a:spcAft>
+                          <a:spcPts val="0"/>
+                        </a:spcAft>
+                        <a:tabLst/>
+                      </a:pPr>
+                      <a:endParaRPr lang="en-US" sz="1800" b="0" i="0" u="none" strike="noStrike" kern="1200" cap="none" dirty="0">
+                        <a:ln>
+                          <a:noFill/>
+                        </a:ln>
+                        <a:latin typeface="Liberation Sans" pitchFamily="18"/>
+                      </a:endParaRPr>
+                    </a:p>
+                  </a:txBody>
+                  <a:tcPr/>
+                </a:tc>
+                <a:extLst>
+                  <a:ext uri="{0D108BD9-81ED-4DB2-BD59-A6C34878D82A}">
+                    <a16:rowId xmlns:a16="http://schemas.microsoft.com/office/drawing/2014/main" val="3619850477"/>
+                  </a:ext>
+                </a:extLst>
+              </a:tr>
+              <a:tr h="1156342">
+                <a:tc>
+                  <a:txBody>
+                    <a:bodyPr/>
+                    <a:lstStyle/>
+                    <a:p>
+                      <a:pPr marL="0" marR="0" lvl="0" indent="0" rtl="0" hangingPunct="0">
+                        <a:lnSpc>
+                          <a:spcPct val="100000"/>
+                        </a:lnSpc>
+                        <a:spcBef>
+                          <a:spcPts val="0"/>
+                        </a:spcBef>
+                        <a:spcAft>
+                          <a:spcPts val="0"/>
+                        </a:spcAft>
+                        <a:buNone/>
+                        <a:tabLst/>
+                        <a:defRPr sz="1800">
+                          <a:latin typeface="Liberation Sans" pitchFamily="34"/>
+                        </a:defRPr>
+                      </a:pPr>
+                      <a:r>
+                        <a:rPr lang="en-US" sz="1800" b="0" i="0" u="none" strike="noStrike" kern="1200" cap="none">
+                          <a:ln>
+                            <a:noFill/>
+                          </a:ln>
+                          <a:latin typeface="Liberation Sans" pitchFamily="34"/>
+                          <a:ea typeface="Noto Sans CJK SC" pitchFamily="2"/>
+                          <a:cs typeface="Lohit Devanagari" pitchFamily="2"/>
+                        </a:rPr>
+                        <a:t>Execution time</a:t>
+                      </a:r>
+                    </a:p>
+                  </a:txBody>
+                  <a:tcPr/>
+                </a:tc>
+                <a:tc>
+                  <a:txBody>
+                    <a:bodyPr/>
+                    <a:lstStyle/>
+                    <a:p>
+                      <a:pPr marL="0" marR="0" indent="0" rtl="0" hangingPunct="0">
+                        <a:lnSpc>
+                          <a:spcPct val="100000"/>
+                        </a:lnSpc>
+                        <a:spcBef>
+                          <a:spcPts val="0"/>
+                        </a:spcBef>
+                        <a:spcAft>
+                          <a:spcPts val="0"/>
+                        </a:spcAft>
+                        <a:tabLst/>
+                      </a:pPr>
+                      <a:endParaRPr lang="en-US" sz="1800" b="0" i="0" u="none" strike="noStrike" kern="1200" cap="none" dirty="0">
+                        <a:ln>
+                          <a:noFill/>
+                        </a:ln>
+                        <a:latin typeface="Liberation Sans" pitchFamily="18"/>
+                      </a:endParaRPr>
+                    </a:p>
+                  </a:txBody>
+                  <a:tcPr/>
+                </a:tc>
+                <a:tc>
+                  <a:txBody>
+                    <a:bodyPr/>
+                    <a:lstStyle/>
+                    <a:p>
+                      <a:pPr marL="0" marR="0" indent="0" rtl="0" hangingPunct="0">
+                        <a:lnSpc>
+                          <a:spcPct val="100000"/>
+                        </a:lnSpc>
+                        <a:spcBef>
+                          <a:spcPts val="0"/>
+                        </a:spcBef>
+                        <a:spcAft>
+                          <a:spcPts val="0"/>
+                        </a:spcAft>
+                        <a:tabLst/>
+                      </a:pPr>
+                      <a:endParaRPr lang="en-US" sz="1800" b="0" i="0" u="none" strike="noStrike" kern="1200" cap="none" dirty="0">
+                        <a:ln>
+                          <a:noFill/>
+                        </a:ln>
+                        <a:latin typeface="Liberation Sans" pitchFamily="18"/>
+                      </a:endParaRPr>
+                    </a:p>
+                  </a:txBody>
+                  <a:tcPr/>
+                </a:tc>
+                <a:tc>
+                  <a:txBody>
+                    <a:bodyPr/>
+                    <a:lstStyle/>
+                    <a:p>
+                      <a:pPr marL="0" marR="0" indent="0" rtl="0" hangingPunct="0">
+                        <a:lnSpc>
+                          <a:spcPct val="100000"/>
+                        </a:lnSpc>
+                        <a:spcBef>
+                          <a:spcPts val="0"/>
+                        </a:spcBef>
+                        <a:spcAft>
+                          <a:spcPts val="0"/>
+                        </a:spcAft>
+                        <a:tabLst/>
+                      </a:pPr>
+                      <a:endParaRPr lang="en-US" sz="1800" b="0" i="0" u="none" strike="noStrike" kern="1200" cap="none" dirty="0">
+                        <a:ln>
+                          <a:noFill/>
+                        </a:ln>
+                        <a:latin typeface="Liberation Sans" pitchFamily="18"/>
+                      </a:endParaRPr>
+                    </a:p>
+                  </a:txBody>
+                  <a:tcPr/>
+                </a:tc>
+                <a:tc>
+                  <a:txBody>
+                    <a:bodyPr/>
+                    <a:lstStyle/>
+                    <a:p>
+                      <a:pPr marL="0" marR="0" indent="0" rtl="0" hangingPunct="0">
+                        <a:lnSpc>
+                          <a:spcPct val="100000"/>
+                        </a:lnSpc>
+                        <a:spcBef>
+                          <a:spcPts val="0"/>
+                        </a:spcBef>
+                        <a:spcAft>
+                          <a:spcPts val="0"/>
+                        </a:spcAft>
+                        <a:tabLst/>
+                      </a:pPr>
+                      <a:endParaRPr lang="en-US" sz="1800" b="0" i="0" u="none" strike="noStrike" kern="1200" cap="none" dirty="0">
+                        <a:ln>
+                          <a:noFill/>
+                        </a:ln>
+                        <a:latin typeface="Liberation Sans" pitchFamily="18"/>
+                      </a:endParaRPr>
+                    </a:p>
+                  </a:txBody>
+                  <a:tcPr/>
+                </a:tc>
+                <a:tc>
+                  <a:txBody>
+                    <a:bodyPr/>
+                    <a:lstStyle/>
+                    <a:p>
+                      <a:pPr marL="0" marR="0" lvl="0" indent="0" rtl="0" hangingPunct="0">
+                        <a:lnSpc>
+                          <a:spcPct val="100000"/>
+                        </a:lnSpc>
+                        <a:spcBef>
+                          <a:spcPts val="0"/>
+                        </a:spcBef>
+                        <a:spcAft>
+                          <a:spcPts val="0"/>
+                        </a:spcAft>
+                        <a:buNone/>
+                        <a:tabLst/>
+                        <a:defRPr sz="1800">
+                          <a:latin typeface="Liberation Sans" pitchFamily="34"/>
+                        </a:defRPr>
+                      </a:pPr>
+                      <a:endParaRPr lang="en-US" sz="1800" b="0" i="0" u="none" strike="noStrike" kern="1200" cap="none" dirty="0">
+                        <a:ln>
+                          <a:noFill/>
+                        </a:ln>
+                        <a:latin typeface="Liberation Sans" pitchFamily="34"/>
+                        <a:ea typeface="Noto Sans CJK SC" pitchFamily="2"/>
+                        <a:cs typeface="Lohit Devanagari" pitchFamily="2"/>
+                      </a:endParaRPr>
+                    </a:p>
+                  </a:txBody>
+                  <a:tcPr/>
+                </a:tc>
+                <a:extLst>
+                  <a:ext uri="{0D108BD9-81ED-4DB2-BD59-A6C34878D82A}">
+                    <a16:rowId xmlns:a16="http://schemas.microsoft.com/office/drawing/2014/main" val="3690084186"/>
+                  </a:ext>
+                </a:extLst>
+              </a:tr>
+            </a:tbl>
+          </a:graphicData>
+        </a:graphic>
+      </p:graphicFrame>
+    </p:spTree>
+    <p:extLst>
+      <p:ext uri="{BB962C8B-B14F-4D97-AF65-F5344CB8AC3E}">
+        <p14:creationId xmlns:p14="http://schemas.microsoft.com/office/powerpoint/2010/main" val="3529144602"/>
+      </p:ext>
+    </p:extLst>
+  </p:cSld>
+  <p:clrMapOvr>
+    <a:masterClrMapping/>
+  </p:clrMapOvr>
+</p:sld>
+</file>
+
+<file path=ppt/slides/slide4.xml><?xml version="1.0" encoding="utf-8"?>
+<p:sld xmlns:a="http://schemas.openxmlformats.org/drawingml/2006/main" xmlns:r="http://schemas.openxmlformats.org/officeDocument/2006/relationships" xmlns:p="http://schemas.openxmlformats.org/presentationml/2006/main">
+  <p:cSld>
+    <p:spTree>
+      <p:nvGrpSpPr>
+        <p:cNvPr id="1" name=""/>
+        <p:cNvGrpSpPr/>
+        <p:nvPr/>
+      </p:nvGrpSpPr>
+      <p:grpSpPr>
+        <a:xfrm>
+          <a:off x="0" y="0"/>
+          <a:ext cx="0" cy="0"/>
+          <a:chOff x="0" y="0"/>
+          <a:chExt cx="0" cy="0"/>
+        </a:xfrm>
+      </p:grpSpPr>
       <p:graphicFrame>
         <p:nvGraphicFramePr>
           <p:cNvPr id="4" name="Table 4">
@@ -5933,7 +8220,7 @@
 </p:sld>
 </file>
 
-<file path=ppt/slides/slide3.xml><?xml version="1.0" encoding="utf-8"?>
+<file path=ppt/slides/slide5.xml><?xml version="1.0" encoding="utf-8"?>
 <p:sld xmlns:a="http://schemas.openxmlformats.org/drawingml/2006/main" xmlns:r="http://schemas.openxmlformats.org/officeDocument/2006/relationships" xmlns:p="http://schemas.openxmlformats.org/presentationml/2006/main">
   <p:cSld>
     <p:spTree>
@@ -6289,7 +8576,7 @@
 </p:sld>
 </file>
 
-<file path=ppt/slides/slide4.xml><?xml version="1.0" encoding="utf-8"?>
+<file path=ppt/slides/slide6.xml><?xml version="1.0" encoding="utf-8"?>
 <p:sld xmlns:a="http://schemas.openxmlformats.org/drawingml/2006/main" xmlns:r="http://schemas.openxmlformats.org/officeDocument/2006/relationships" xmlns:p="http://schemas.openxmlformats.org/presentationml/2006/main">
   <p:cSld>
     <p:spTree>
@@ -6645,7 +8932,7 @@
 </p:sld>
 </file>
 
-<file path=ppt/slides/slide5.xml><?xml version="1.0" encoding="utf-8"?>
+<file path=ppt/slides/slide7.xml><?xml version="1.0" encoding="utf-8"?>
 <p:sld xmlns:a="http://schemas.openxmlformats.org/drawingml/2006/main" xmlns:r="http://schemas.openxmlformats.org/officeDocument/2006/relationships" xmlns:p="http://schemas.openxmlformats.org/presentationml/2006/main">
   <p:cSld>
     <p:spTree>
@@ -6989,1093 +9276,7 @@
 </p:sld>
 </file>
 
-<file path=ppt/slides/slide6.xml><?xml version="1.0" encoding="utf-8"?>
-<p:sld xmlns:a="http://schemas.openxmlformats.org/drawingml/2006/main" xmlns:r="http://schemas.openxmlformats.org/officeDocument/2006/relationships" xmlns:p="http://schemas.openxmlformats.org/presentationml/2006/main">
-  <p:cSld>
-    <p:spTree>
-      <p:nvGrpSpPr>
-        <p:cNvPr id="1" name=""/>
-        <p:cNvGrpSpPr/>
-        <p:nvPr/>
-      </p:nvGrpSpPr>
-      <p:grpSpPr>
-        <a:xfrm>
-          <a:off x="0" y="0"/>
-          <a:ext cx="0" cy="0"/>
-          <a:chOff x="0" y="0"/>
-          <a:chExt cx="0" cy="0"/>
-        </a:xfrm>
-      </p:grpSpPr>
-      <p:sp>
-        <p:nvSpPr>
-          <p:cNvPr id="2" name="Title 1">
-            <a:extLst>
-              <a:ext uri="{FF2B5EF4-FFF2-40B4-BE49-F238E27FC236}">
-                <a16:creationId xmlns:a16="http://schemas.microsoft.com/office/drawing/2014/main" id="{0BBA1E42-504A-4394-9885-44ACD2FD632B}"/>
-              </a:ext>
-            </a:extLst>
-          </p:cNvPr>
-          <p:cNvSpPr txBox="1">
-            <a:spLocks noGrp="1"/>
-          </p:cNvSpPr>
-          <p:nvPr>
-            <p:ph type="title" idx="4294967295"/>
-          </p:nvPr>
-        </p:nvSpPr>
-        <p:spPr>
-          <a:xfrm>
-            <a:off x="410215" y="0"/>
-            <a:ext cx="9581848" cy="891136"/>
-          </a:xfrm>
-        </p:spPr>
-        <p:txBody>
-          <a:bodyPr vert="horz"/>
-          <a:lstStyle/>
-          <a:p>
-            <a:pPr lvl="0"/>
-            <a:r>
-              <a:rPr lang="en-US" sz="2000" dirty="0"/>
-              <a:t>Quick Comparison on NASA Shuttle Dataset</a:t>
-            </a:r>
-          </a:p>
-        </p:txBody>
-      </p:sp>
-      <p:graphicFrame>
-        <p:nvGraphicFramePr>
-          <p:cNvPr id="4" name="Table 3">
-            <a:extLst>
-              <a:ext uri="{FF2B5EF4-FFF2-40B4-BE49-F238E27FC236}">
-                <a16:creationId xmlns:a16="http://schemas.microsoft.com/office/drawing/2014/main" id="{A47452BE-25FD-4945-B15C-7AB50AB45EC8}"/>
-              </a:ext>
-            </a:extLst>
-          </p:cNvPr>
-          <p:cNvGraphicFramePr>
-            <a:graphicFrameLocks noGrp="1"/>
-          </p:cNvGraphicFramePr>
-          <p:nvPr>
-            <p:extLst>
-              <p:ext uri="{D42A27DB-BD31-4B8C-83A1-F6EECF244321}">
-                <p14:modId xmlns:p14="http://schemas.microsoft.com/office/powerpoint/2010/main" val="1646860315"/>
-              </p:ext>
-            </p:extLst>
-          </p:nvPr>
-        </p:nvGraphicFramePr>
-        <p:xfrm>
-          <a:off x="410214" y="891136"/>
-          <a:ext cx="8762064" cy="4503429"/>
-        </p:xfrm>
-        <a:graphic>
-          <a:graphicData uri="http://schemas.openxmlformats.org/drawingml/2006/table">
-            <a:tbl>
-              <a:tblPr firstRow="1" bandRow="1">
-                <a:tableStyleId>{E238C490-6FC5-45BF-8602-39B36D2FA802}</a:tableStyleId>
-              </a:tblPr>
-              <a:tblGrid>
-                <a:gridCol w="1657330">
-                  <a:extLst>
-                    <a:ext uri="{9D8B030D-6E8A-4147-A177-3AD203B41FA5}">
-                      <a16:colId xmlns:a16="http://schemas.microsoft.com/office/drawing/2014/main" val="549638599"/>
-                    </a:ext>
-                  </a:extLst>
-                </a:gridCol>
-                <a:gridCol w="1260656">
-                  <a:extLst>
-                    <a:ext uri="{9D8B030D-6E8A-4147-A177-3AD203B41FA5}">
-                      <a16:colId xmlns:a16="http://schemas.microsoft.com/office/drawing/2014/main" val="388096317"/>
-                    </a:ext>
-                  </a:extLst>
-                </a:gridCol>
-                <a:gridCol w="1458993">
-                  <a:extLst>
-                    <a:ext uri="{9D8B030D-6E8A-4147-A177-3AD203B41FA5}">
-                      <a16:colId xmlns:a16="http://schemas.microsoft.com/office/drawing/2014/main" val="2056048235"/>
-                    </a:ext>
-                  </a:extLst>
-                </a:gridCol>
-                <a:gridCol w="1458993">
-                  <a:extLst>
-                    <a:ext uri="{9D8B030D-6E8A-4147-A177-3AD203B41FA5}">
-                      <a16:colId xmlns:a16="http://schemas.microsoft.com/office/drawing/2014/main" val="2653049669"/>
-                    </a:ext>
-                  </a:extLst>
-                </a:gridCol>
-                <a:gridCol w="1463046">
-                  <a:extLst>
-                    <a:ext uri="{9D8B030D-6E8A-4147-A177-3AD203B41FA5}">
-                      <a16:colId xmlns:a16="http://schemas.microsoft.com/office/drawing/2014/main" val="2807278400"/>
-                    </a:ext>
-                  </a:extLst>
-                </a:gridCol>
-                <a:gridCol w="1463046">
-                  <a:extLst>
-                    <a:ext uri="{9D8B030D-6E8A-4147-A177-3AD203B41FA5}">
-                      <a16:colId xmlns:a16="http://schemas.microsoft.com/office/drawing/2014/main" val="3910885709"/>
-                    </a:ext>
-                  </a:extLst>
-                </a:gridCol>
-              </a:tblGrid>
-              <a:tr h="889494">
-                <a:tc>
-                  <a:txBody>
-                    <a:bodyPr/>
-                    <a:lstStyle/>
-                    <a:p>
-                      <a:pPr marL="0" marR="0" lvl="0" indent="0" rtl="0" hangingPunct="0">
-                        <a:lnSpc>
-                          <a:spcPct val="100000"/>
-                        </a:lnSpc>
-                        <a:spcBef>
-                          <a:spcPts val="0"/>
-                        </a:spcBef>
-                        <a:spcAft>
-                          <a:spcPts val="0"/>
-                        </a:spcAft>
-                        <a:buNone/>
-                        <a:tabLst/>
-                      </a:pPr>
-                      <a:r>
-                        <a:rPr lang="en-US" sz="1800" b="0" i="0" u="none" strike="noStrike" kern="1200" cap="none" dirty="0">
-                          <a:ln>
-                            <a:noFill/>
-                          </a:ln>
-                          <a:latin typeface="Liberation Sans" pitchFamily="34"/>
-                          <a:ea typeface="Noto Sans CJK SC" pitchFamily="2"/>
-                          <a:cs typeface="Lohit Devanagari" pitchFamily="2"/>
-                        </a:rPr>
-                        <a:t>Metric\Model</a:t>
-                      </a:r>
-                    </a:p>
-                  </a:txBody>
-                  <a:tcPr/>
-                </a:tc>
-                <a:tc>
-                  <a:txBody>
-                    <a:bodyPr/>
-                    <a:lstStyle/>
-                    <a:p>
-                      <a:pPr marL="0" marR="0" lvl="0" indent="0" rtl="0" hangingPunct="0">
-                        <a:lnSpc>
-                          <a:spcPct val="100000"/>
-                        </a:lnSpc>
-                        <a:spcBef>
-                          <a:spcPts val="0"/>
-                        </a:spcBef>
-                        <a:spcAft>
-                          <a:spcPts val="0"/>
-                        </a:spcAft>
-                        <a:buNone/>
-                        <a:tabLst/>
-                        <a:defRPr sz="1800">
-                          <a:latin typeface="Liberation Sans" pitchFamily="34"/>
-                        </a:defRPr>
-                      </a:pPr>
-                      <a:r>
-                        <a:rPr lang="en-US" sz="1800" b="0" i="0" u="none" strike="noStrike" kern="1200" cap="none">
-                          <a:ln>
-                            <a:noFill/>
-                          </a:ln>
-                          <a:latin typeface="Liberation Sans" pitchFamily="34"/>
-                          <a:ea typeface="Noto Sans CJK SC" pitchFamily="2"/>
-                          <a:cs typeface="Lohit Devanagari" pitchFamily="2"/>
-                        </a:rPr>
-                        <a:t>AR</a:t>
-                      </a:r>
-                    </a:p>
-                  </a:txBody>
-                  <a:tcPr/>
-                </a:tc>
-                <a:tc>
-                  <a:txBody>
-                    <a:bodyPr/>
-                    <a:lstStyle/>
-                    <a:p>
-                      <a:pPr marL="0" marR="0" lvl="0" indent="0" rtl="0" hangingPunct="0">
-                        <a:lnSpc>
-                          <a:spcPct val="100000"/>
-                        </a:lnSpc>
-                        <a:spcBef>
-                          <a:spcPts val="0"/>
-                        </a:spcBef>
-                        <a:spcAft>
-                          <a:spcPts val="0"/>
-                        </a:spcAft>
-                        <a:buNone/>
-                        <a:tabLst/>
-                        <a:defRPr sz="1800">
-                          <a:latin typeface="Liberation Sans" pitchFamily="34"/>
-                        </a:defRPr>
-                      </a:pPr>
-                      <a:r>
-                        <a:rPr lang="en-US" sz="1800" b="0" i="0" u="none" strike="noStrike" kern="1200" cap="none">
-                          <a:ln>
-                            <a:noFill/>
-                          </a:ln>
-                          <a:latin typeface="Liberation Sans" pitchFamily="34"/>
-                          <a:ea typeface="Noto Sans CJK SC" pitchFamily="2"/>
-                          <a:cs typeface="Lohit Devanagari" pitchFamily="2"/>
-                        </a:rPr>
-                        <a:t>MA</a:t>
-                      </a:r>
-                    </a:p>
-                  </a:txBody>
-                  <a:tcPr/>
-                </a:tc>
-                <a:tc>
-                  <a:txBody>
-                    <a:bodyPr/>
-                    <a:lstStyle/>
-                    <a:p>
-                      <a:pPr marL="0" marR="0" lvl="0" indent="0" rtl="0" hangingPunct="0">
-                        <a:lnSpc>
-                          <a:spcPct val="100000"/>
-                        </a:lnSpc>
-                        <a:spcBef>
-                          <a:spcPts val="0"/>
-                        </a:spcBef>
-                        <a:spcAft>
-                          <a:spcPts val="0"/>
-                        </a:spcAft>
-                        <a:buNone/>
-                        <a:tabLst/>
-                        <a:defRPr sz="1800">
-                          <a:latin typeface="Liberation Sans" pitchFamily="34"/>
-                        </a:defRPr>
-                      </a:pPr>
-                      <a:r>
-                        <a:rPr lang="en-US" sz="1800" b="0" i="0" u="none" strike="noStrike" kern="1200" cap="none">
-                          <a:ln>
-                            <a:noFill/>
-                          </a:ln>
-                          <a:latin typeface="Liberation Sans" pitchFamily="34"/>
-                          <a:ea typeface="Noto Sans CJK SC" pitchFamily="2"/>
-                          <a:cs typeface="Lohit Devanagari" pitchFamily="2"/>
-                        </a:rPr>
-                        <a:t>ARIMA</a:t>
-                      </a:r>
-                    </a:p>
-                  </a:txBody>
-                  <a:tcPr/>
-                </a:tc>
-                <a:tc>
-                  <a:txBody>
-                    <a:bodyPr/>
-                    <a:lstStyle/>
-                    <a:p>
-                      <a:pPr marL="0" marR="0" lvl="0" indent="0" rtl="0" hangingPunct="0">
-                        <a:lnSpc>
-                          <a:spcPct val="100000"/>
-                        </a:lnSpc>
-                        <a:spcBef>
-                          <a:spcPts val="0"/>
-                        </a:spcBef>
-                        <a:spcAft>
-                          <a:spcPts val="0"/>
-                        </a:spcAft>
-                        <a:buNone/>
-                        <a:tabLst/>
-                        <a:defRPr sz="1800">
-                          <a:latin typeface="Liberation Sans" pitchFamily="34"/>
-                        </a:defRPr>
-                      </a:pPr>
-                      <a:r>
-                        <a:rPr lang="en-US" sz="1800" b="0" i="0" u="none" strike="noStrike" kern="1200" cap="none" dirty="0">
-                          <a:ln>
-                            <a:noFill/>
-                          </a:ln>
-                          <a:latin typeface="Liberation Sans" pitchFamily="34"/>
-                          <a:ea typeface="Noto Sans CJK SC" pitchFamily="2"/>
-                          <a:cs typeface="Lohit Devanagari" pitchFamily="2"/>
-                        </a:rPr>
-                        <a:t>STL</a:t>
-                      </a:r>
-                    </a:p>
-                  </a:txBody>
-                  <a:tcPr/>
-                </a:tc>
-                <a:tc>
-                  <a:txBody>
-                    <a:bodyPr/>
-                    <a:lstStyle/>
-                    <a:p>
-                      <a:pPr marL="0" marR="0" lvl="0" indent="0" rtl="0" hangingPunct="0">
-                        <a:lnSpc>
-                          <a:spcPct val="100000"/>
-                        </a:lnSpc>
-                        <a:spcBef>
-                          <a:spcPts val="0"/>
-                        </a:spcBef>
-                        <a:spcAft>
-                          <a:spcPts val="0"/>
-                        </a:spcAft>
-                        <a:buNone/>
-                        <a:tabLst/>
-                        <a:defRPr sz="1800">
-                          <a:latin typeface="Liberation Sans" pitchFamily="34"/>
-                        </a:defRPr>
-                      </a:pPr>
-                      <a:r>
-                        <a:rPr lang="en-US" sz="1800" b="0" i="0" u="none" strike="noStrike" kern="1200" cap="none" dirty="0">
-                          <a:ln>
-                            <a:noFill/>
-                          </a:ln>
-                          <a:latin typeface="Liberation Sans" pitchFamily="34"/>
-                          <a:ea typeface="Noto Sans CJK SC" pitchFamily="2"/>
-                          <a:cs typeface="Lohit Devanagari" pitchFamily="2"/>
-                        </a:rPr>
-                        <a:t>HW</a:t>
-                      </a:r>
-                    </a:p>
-                  </a:txBody>
-                  <a:tcPr/>
-                </a:tc>
-                <a:extLst>
-                  <a:ext uri="{0D108BD9-81ED-4DB2-BD59-A6C34878D82A}">
-                    <a16:rowId xmlns:a16="http://schemas.microsoft.com/office/drawing/2014/main" val="426170887"/>
-                  </a:ext>
-                </a:extLst>
-              </a:tr>
-              <a:tr h="889494">
-                <a:tc>
-                  <a:txBody>
-                    <a:bodyPr/>
-                    <a:lstStyle/>
-                    <a:p>
-                      <a:pPr marL="0" marR="0" lvl="0" indent="0" rtl="0" hangingPunct="0">
-                        <a:lnSpc>
-                          <a:spcPct val="100000"/>
-                        </a:lnSpc>
-                        <a:spcBef>
-                          <a:spcPts val="0"/>
-                        </a:spcBef>
-                        <a:spcAft>
-                          <a:spcPts val="0"/>
-                        </a:spcAft>
-                        <a:buNone/>
-                        <a:tabLst/>
-                        <a:defRPr sz="1800">
-                          <a:latin typeface="Liberation Sans" pitchFamily="34"/>
-                        </a:defRPr>
-                      </a:pPr>
-                      <a:r>
-                        <a:rPr lang="en-US" sz="1800" b="0" i="0" u="none" strike="noStrike" kern="1200" cap="none" dirty="0">
-                          <a:ln>
-                            <a:noFill/>
-                          </a:ln>
-                          <a:latin typeface="Liberation Sans" pitchFamily="34"/>
-                          <a:ea typeface="Noto Sans CJK SC" pitchFamily="2"/>
-                          <a:cs typeface="Lohit Devanagari" pitchFamily="2"/>
-                        </a:rPr>
-                        <a:t>Avg F1</a:t>
-                      </a:r>
-                    </a:p>
-                  </a:txBody>
-                  <a:tcPr/>
-                </a:tc>
-                <a:tc>
-                  <a:txBody>
-                    <a:bodyPr/>
-                    <a:lstStyle/>
-                    <a:p>
-                      <a:pPr marL="0" marR="0" indent="0" rtl="0" hangingPunct="0">
-                        <a:lnSpc>
-                          <a:spcPct val="100000"/>
-                        </a:lnSpc>
-                        <a:spcBef>
-                          <a:spcPts val="0"/>
-                        </a:spcBef>
-                        <a:spcAft>
-                          <a:spcPts val="0"/>
-                        </a:spcAft>
-                        <a:tabLst/>
-                      </a:pPr>
-                      <a:endParaRPr lang="en-US" sz="1800" b="0" i="0" u="none" strike="noStrike" kern="1200" cap="none" dirty="0">
-                        <a:ln>
-                          <a:noFill/>
-                        </a:ln>
-                        <a:latin typeface="Liberation Sans" pitchFamily="18"/>
-                      </a:endParaRPr>
-                    </a:p>
-                  </a:txBody>
-                  <a:tcPr/>
-                </a:tc>
-                <a:tc>
-                  <a:txBody>
-                    <a:bodyPr/>
-                    <a:lstStyle/>
-                    <a:p>
-                      <a:pPr marL="0" marR="0" indent="0" rtl="0" hangingPunct="0">
-                        <a:lnSpc>
-                          <a:spcPct val="100000"/>
-                        </a:lnSpc>
-                        <a:spcBef>
-                          <a:spcPts val="0"/>
-                        </a:spcBef>
-                        <a:spcAft>
-                          <a:spcPts val="0"/>
-                        </a:spcAft>
-                        <a:tabLst/>
-                      </a:pPr>
-                      <a:endParaRPr lang="en-US" sz="1800" b="0" i="0" u="none" strike="noStrike" kern="1200" cap="none" dirty="0">
-                        <a:ln>
-                          <a:noFill/>
-                        </a:ln>
-                        <a:latin typeface="Liberation Sans" pitchFamily="18"/>
-                      </a:endParaRPr>
-                    </a:p>
-                  </a:txBody>
-                  <a:tcPr/>
-                </a:tc>
-                <a:tc>
-                  <a:txBody>
-                    <a:bodyPr/>
-                    <a:lstStyle/>
-                    <a:p>
-                      <a:pPr marL="0" marR="0" indent="0" rtl="0" hangingPunct="0">
-                        <a:lnSpc>
-                          <a:spcPct val="100000"/>
-                        </a:lnSpc>
-                        <a:spcBef>
-                          <a:spcPts val="0"/>
-                        </a:spcBef>
-                        <a:spcAft>
-                          <a:spcPts val="0"/>
-                        </a:spcAft>
-                        <a:tabLst/>
-                      </a:pPr>
-                      <a:endParaRPr lang="en-US" sz="1800" b="0" i="0" u="none" strike="noStrike" kern="1200" cap="none" dirty="0">
-                        <a:ln>
-                          <a:noFill/>
-                        </a:ln>
-                        <a:latin typeface="Liberation Sans" pitchFamily="18"/>
-                      </a:endParaRPr>
-                    </a:p>
-                  </a:txBody>
-                  <a:tcPr/>
-                </a:tc>
-                <a:tc>
-                  <a:txBody>
-                    <a:bodyPr/>
-                    <a:lstStyle/>
-                    <a:p>
-                      <a:pPr marL="0" marR="0" indent="0" rtl="0" hangingPunct="0">
-                        <a:lnSpc>
-                          <a:spcPct val="100000"/>
-                        </a:lnSpc>
-                        <a:spcBef>
-                          <a:spcPts val="0"/>
-                        </a:spcBef>
-                        <a:spcAft>
-                          <a:spcPts val="0"/>
-                        </a:spcAft>
-                        <a:tabLst/>
-                      </a:pPr>
-                      <a:endParaRPr lang="en-US" sz="1800" b="0" i="0" u="none" strike="noStrike" kern="1200" cap="none" dirty="0">
-                        <a:ln>
-                          <a:noFill/>
-                        </a:ln>
-                        <a:latin typeface="Liberation Sans" pitchFamily="18"/>
-                      </a:endParaRPr>
-                    </a:p>
-                  </a:txBody>
-                  <a:tcPr/>
-                </a:tc>
-                <a:tc>
-                  <a:txBody>
-                    <a:bodyPr/>
-                    <a:lstStyle/>
-                    <a:p>
-                      <a:pPr marL="0" marR="0" lvl="0" indent="0" rtl="0" hangingPunct="0">
-                        <a:lnSpc>
-                          <a:spcPct val="100000"/>
-                        </a:lnSpc>
-                        <a:spcBef>
-                          <a:spcPts val="0"/>
-                        </a:spcBef>
-                        <a:spcAft>
-                          <a:spcPts val="0"/>
-                        </a:spcAft>
-                        <a:buNone/>
-                        <a:tabLst/>
-                        <a:defRPr sz="1800">
-                          <a:latin typeface="Liberation Sans" pitchFamily="34"/>
-                        </a:defRPr>
-                      </a:pPr>
-                      <a:endParaRPr lang="en-US" sz="1800" b="0" i="0" u="none" strike="noStrike" kern="1200" cap="none" dirty="0">
-                        <a:ln>
-                          <a:noFill/>
-                        </a:ln>
-                        <a:latin typeface="Liberation Sans" pitchFamily="34"/>
-                        <a:ea typeface="Noto Sans CJK SC" pitchFamily="2"/>
-                        <a:cs typeface="Lohit Devanagari" pitchFamily="2"/>
-                      </a:endParaRPr>
-                    </a:p>
-                  </a:txBody>
-                  <a:tcPr/>
-                </a:tc>
-                <a:extLst>
-                  <a:ext uri="{0D108BD9-81ED-4DB2-BD59-A6C34878D82A}">
-                    <a16:rowId xmlns:a16="http://schemas.microsoft.com/office/drawing/2014/main" val="1668712776"/>
-                  </a:ext>
-                </a:extLst>
-              </a:tr>
-              <a:tr h="889494">
-                <a:tc>
-                  <a:txBody>
-                    <a:bodyPr/>
-                    <a:lstStyle/>
-                    <a:p>
-                      <a:pPr marL="0" marR="0" lvl="0" indent="0" rtl="0" hangingPunct="0">
-                        <a:lnSpc>
-                          <a:spcPct val="100000"/>
-                        </a:lnSpc>
-                        <a:spcBef>
-                          <a:spcPts val="0"/>
-                        </a:spcBef>
-                        <a:spcAft>
-                          <a:spcPts val="0"/>
-                        </a:spcAft>
-                        <a:buNone/>
-                        <a:tabLst/>
-                        <a:defRPr sz="1800">
-                          <a:latin typeface="Liberation Sans" pitchFamily="34"/>
-                        </a:defRPr>
-                      </a:pPr>
-                      <a:r>
-                        <a:rPr lang="en-US" sz="1800" b="0" i="0" u="none" strike="noStrike" kern="1200" cap="none">
-                          <a:ln>
-                            <a:noFill/>
-                          </a:ln>
-                          <a:latin typeface="Liberation Sans" pitchFamily="34"/>
-                          <a:ea typeface="Noto Sans CJK SC" pitchFamily="2"/>
-                          <a:cs typeface="Lohit Devanagari" pitchFamily="2"/>
-                        </a:rPr>
-                        <a:t>Avg Precision</a:t>
-                      </a:r>
-                    </a:p>
-                  </a:txBody>
-                  <a:tcPr/>
-                </a:tc>
-                <a:tc>
-                  <a:txBody>
-                    <a:bodyPr/>
-                    <a:lstStyle/>
-                    <a:p>
-                      <a:pPr marL="0" marR="0" indent="0" rtl="0" hangingPunct="0">
-                        <a:lnSpc>
-                          <a:spcPct val="100000"/>
-                        </a:lnSpc>
-                        <a:spcBef>
-                          <a:spcPts val="0"/>
-                        </a:spcBef>
-                        <a:spcAft>
-                          <a:spcPts val="0"/>
-                        </a:spcAft>
-                        <a:tabLst/>
-                      </a:pPr>
-                      <a:endParaRPr lang="en-US" sz="1800" b="0" i="0" u="none" strike="noStrike" kern="1200" cap="none" dirty="0">
-                        <a:ln>
-                          <a:noFill/>
-                        </a:ln>
-                        <a:latin typeface="Liberation Sans" pitchFamily="18"/>
-                      </a:endParaRPr>
-                    </a:p>
-                  </a:txBody>
-                  <a:tcPr/>
-                </a:tc>
-                <a:tc>
-                  <a:txBody>
-                    <a:bodyPr/>
-                    <a:lstStyle/>
-                    <a:p>
-                      <a:pPr marL="0" marR="0" indent="0" rtl="0" hangingPunct="0">
-                        <a:lnSpc>
-                          <a:spcPct val="100000"/>
-                        </a:lnSpc>
-                        <a:spcBef>
-                          <a:spcPts val="0"/>
-                        </a:spcBef>
-                        <a:spcAft>
-                          <a:spcPts val="0"/>
-                        </a:spcAft>
-                        <a:tabLst/>
-                      </a:pPr>
-                      <a:endParaRPr lang="en-US" sz="1800" b="0" i="0" u="none" strike="noStrike" kern="1200" cap="none" dirty="0">
-                        <a:ln>
-                          <a:noFill/>
-                        </a:ln>
-                        <a:latin typeface="Liberation Sans" pitchFamily="18"/>
-                      </a:endParaRPr>
-                    </a:p>
-                  </a:txBody>
-                  <a:tcPr/>
-                </a:tc>
-                <a:tc>
-                  <a:txBody>
-                    <a:bodyPr/>
-                    <a:lstStyle/>
-                    <a:p>
-                      <a:pPr marL="0" marR="0" indent="0" rtl="0" hangingPunct="0">
-                        <a:lnSpc>
-                          <a:spcPct val="100000"/>
-                        </a:lnSpc>
-                        <a:spcBef>
-                          <a:spcPts val="0"/>
-                        </a:spcBef>
-                        <a:spcAft>
-                          <a:spcPts val="0"/>
-                        </a:spcAft>
-                        <a:tabLst/>
-                      </a:pPr>
-                      <a:endParaRPr lang="en-US" sz="1800" b="0" i="0" u="none" strike="noStrike" kern="1200" cap="none" dirty="0">
-                        <a:ln>
-                          <a:noFill/>
-                        </a:ln>
-                        <a:latin typeface="Liberation Sans" pitchFamily="18"/>
-                      </a:endParaRPr>
-                    </a:p>
-                  </a:txBody>
-                  <a:tcPr/>
-                </a:tc>
-                <a:tc>
-                  <a:txBody>
-                    <a:bodyPr/>
-                    <a:lstStyle/>
-                    <a:p>
-                      <a:pPr marL="0" marR="0" indent="0" rtl="0" hangingPunct="0">
-                        <a:lnSpc>
-                          <a:spcPct val="100000"/>
-                        </a:lnSpc>
-                        <a:spcBef>
-                          <a:spcPts val="0"/>
-                        </a:spcBef>
-                        <a:spcAft>
-                          <a:spcPts val="0"/>
-                        </a:spcAft>
-                        <a:tabLst/>
-                      </a:pPr>
-                      <a:endParaRPr lang="en-US" sz="1800" b="0" i="0" u="none" strike="noStrike" kern="1200" cap="none" dirty="0">
-                        <a:ln>
-                          <a:noFill/>
-                        </a:ln>
-                        <a:latin typeface="Liberation Sans" pitchFamily="18"/>
-                      </a:endParaRPr>
-                    </a:p>
-                  </a:txBody>
-                  <a:tcPr/>
-                </a:tc>
-                <a:tc>
-                  <a:txBody>
-                    <a:bodyPr/>
-                    <a:lstStyle/>
-                    <a:p>
-                      <a:pPr marL="0" marR="0" indent="0" rtl="0" hangingPunct="0">
-                        <a:lnSpc>
-                          <a:spcPct val="100000"/>
-                        </a:lnSpc>
-                        <a:spcBef>
-                          <a:spcPts val="0"/>
-                        </a:spcBef>
-                        <a:spcAft>
-                          <a:spcPts val="0"/>
-                        </a:spcAft>
-                        <a:tabLst/>
-                      </a:pPr>
-                      <a:endParaRPr lang="en-US" sz="1800" b="0" i="0" u="none" strike="noStrike" kern="1200" cap="none" dirty="0">
-                        <a:ln>
-                          <a:noFill/>
-                        </a:ln>
-                        <a:latin typeface="Liberation Sans" pitchFamily="18"/>
-                      </a:endParaRPr>
-                    </a:p>
-                  </a:txBody>
-                  <a:tcPr/>
-                </a:tc>
-                <a:extLst>
-                  <a:ext uri="{0D108BD9-81ED-4DB2-BD59-A6C34878D82A}">
-                    <a16:rowId xmlns:a16="http://schemas.microsoft.com/office/drawing/2014/main" val="2522885085"/>
-                  </a:ext>
-                </a:extLst>
-              </a:tr>
-              <a:tr h="678605">
-                <a:tc>
-                  <a:txBody>
-                    <a:bodyPr/>
-                    <a:lstStyle/>
-                    <a:p>
-                      <a:pPr marL="0" marR="0" lvl="0" indent="0" rtl="0" hangingPunct="0">
-                        <a:lnSpc>
-                          <a:spcPct val="100000"/>
-                        </a:lnSpc>
-                        <a:spcBef>
-                          <a:spcPts val="0"/>
-                        </a:spcBef>
-                        <a:spcAft>
-                          <a:spcPts val="0"/>
-                        </a:spcAft>
-                        <a:buNone/>
-                        <a:tabLst/>
-                        <a:defRPr sz="1800">
-                          <a:latin typeface="Liberation Sans" pitchFamily="34"/>
-                        </a:defRPr>
-                      </a:pPr>
-                      <a:r>
-                        <a:rPr lang="en-US" sz="1800" b="0" i="0" u="none" strike="noStrike" kern="1200" cap="none">
-                          <a:ln>
-                            <a:noFill/>
-                          </a:ln>
-                          <a:latin typeface="Liberation Sans" pitchFamily="34"/>
-                          <a:ea typeface="Noto Sans CJK SC" pitchFamily="2"/>
-                          <a:cs typeface="Lohit Devanagari" pitchFamily="2"/>
-                        </a:rPr>
-                        <a:t>Avg Recall</a:t>
-                      </a:r>
-                    </a:p>
-                  </a:txBody>
-                  <a:tcPr/>
-                </a:tc>
-                <a:tc>
-                  <a:txBody>
-                    <a:bodyPr/>
-                    <a:lstStyle/>
-                    <a:p>
-                      <a:pPr marL="0" marR="0" indent="0" rtl="0" hangingPunct="0">
-                        <a:lnSpc>
-                          <a:spcPct val="100000"/>
-                        </a:lnSpc>
-                        <a:spcBef>
-                          <a:spcPts val="0"/>
-                        </a:spcBef>
-                        <a:spcAft>
-                          <a:spcPts val="0"/>
-                        </a:spcAft>
-                        <a:tabLst/>
-                      </a:pPr>
-                      <a:endParaRPr lang="en-US" sz="1800" b="0" i="0" u="none" strike="noStrike" kern="1200" cap="none" dirty="0">
-                        <a:ln>
-                          <a:noFill/>
-                        </a:ln>
-                        <a:latin typeface="Liberation Sans" pitchFamily="18"/>
-                      </a:endParaRPr>
-                    </a:p>
-                  </a:txBody>
-                  <a:tcPr/>
-                </a:tc>
-                <a:tc>
-                  <a:txBody>
-                    <a:bodyPr/>
-                    <a:lstStyle/>
-                    <a:p>
-                      <a:pPr marL="0" marR="0" indent="0" rtl="0" hangingPunct="0">
-                        <a:lnSpc>
-                          <a:spcPct val="100000"/>
-                        </a:lnSpc>
-                        <a:spcBef>
-                          <a:spcPts val="0"/>
-                        </a:spcBef>
-                        <a:spcAft>
-                          <a:spcPts val="0"/>
-                        </a:spcAft>
-                        <a:tabLst/>
-                      </a:pPr>
-                      <a:endParaRPr lang="en-US" sz="1800" b="0" i="0" u="none" strike="noStrike" kern="1200" cap="none" dirty="0">
-                        <a:ln>
-                          <a:noFill/>
-                        </a:ln>
-                        <a:latin typeface="Liberation Sans" pitchFamily="18"/>
-                      </a:endParaRPr>
-                    </a:p>
-                  </a:txBody>
-                  <a:tcPr/>
-                </a:tc>
-                <a:tc>
-                  <a:txBody>
-                    <a:bodyPr/>
-                    <a:lstStyle/>
-                    <a:p>
-                      <a:pPr marL="0" marR="0" indent="0" rtl="0" hangingPunct="0">
-                        <a:lnSpc>
-                          <a:spcPct val="100000"/>
-                        </a:lnSpc>
-                        <a:spcBef>
-                          <a:spcPts val="0"/>
-                        </a:spcBef>
-                        <a:spcAft>
-                          <a:spcPts val="0"/>
-                        </a:spcAft>
-                        <a:tabLst/>
-                      </a:pPr>
-                      <a:endParaRPr lang="en-US" sz="1800" b="0" i="0" u="none" strike="noStrike" kern="1200" cap="none" dirty="0">
-                        <a:ln>
-                          <a:noFill/>
-                        </a:ln>
-                        <a:latin typeface="Liberation Sans" pitchFamily="18"/>
-                      </a:endParaRPr>
-                    </a:p>
-                  </a:txBody>
-                  <a:tcPr/>
-                </a:tc>
-                <a:tc>
-                  <a:txBody>
-                    <a:bodyPr/>
-                    <a:lstStyle/>
-                    <a:p>
-                      <a:pPr marL="0" marR="0" indent="0" rtl="0" hangingPunct="0">
-                        <a:lnSpc>
-                          <a:spcPct val="100000"/>
-                        </a:lnSpc>
-                        <a:spcBef>
-                          <a:spcPts val="0"/>
-                        </a:spcBef>
-                        <a:spcAft>
-                          <a:spcPts val="0"/>
-                        </a:spcAft>
-                        <a:tabLst/>
-                      </a:pPr>
-                      <a:endParaRPr lang="en-US" sz="1800" b="0" i="0" u="none" strike="noStrike" kern="1200" cap="none" dirty="0">
-                        <a:ln>
-                          <a:noFill/>
-                        </a:ln>
-                        <a:latin typeface="Liberation Sans" pitchFamily="18"/>
-                      </a:endParaRPr>
-                    </a:p>
-                  </a:txBody>
-                  <a:tcPr/>
-                </a:tc>
-                <a:tc>
-                  <a:txBody>
-                    <a:bodyPr/>
-                    <a:lstStyle/>
-                    <a:p>
-                      <a:pPr marL="0" marR="0" indent="0" rtl="0" hangingPunct="0">
-                        <a:lnSpc>
-                          <a:spcPct val="100000"/>
-                        </a:lnSpc>
-                        <a:spcBef>
-                          <a:spcPts val="0"/>
-                        </a:spcBef>
-                        <a:spcAft>
-                          <a:spcPts val="0"/>
-                        </a:spcAft>
-                        <a:tabLst/>
-                      </a:pPr>
-                      <a:endParaRPr lang="en-US" sz="1800" b="0" i="0" u="none" strike="noStrike" kern="1200" cap="none" dirty="0">
-                        <a:ln>
-                          <a:noFill/>
-                        </a:ln>
-                        <a:latin typeface="Liberation Sans" pitchFamily="18"/>
-                      </a:endParaRPr>
-                    </a:p>
-                  </a:txBody>
-                  <a:tcPr/>
-                </a:tc>
-                <a:extLst>
-                  <a:ext uri="{0D108BD9-81ED-4DB2-BD59-A6C34878D82A}">
-                    <a16:rowId xmlns:a16="http://schemas.microsoft.com/office/drawing/2014/main" val="3619850477"/>
-                  </a:ext>
-                </a:extLst>
-              </a:tr>
-              <a:tr h="1156342">
-                <a:tc>
-                  <a:txBody>
-                    <a:bodyPr/>
-                    <a:lstStyle/>
-                    <a:p>
-                      <a:pPr marL="0" marR="0" lvl="0" indent="0" rtl="0" hangingPunct="0">
-                        <a:lnSpc>
-                          <a:spcPct val="100000"/>
-                        </a:lnSpc>
-                        <a:spcBef>
-                          <a:spcPts val="0"/>
-                        </a:spcBef>
-                        <a:spcAft>
-                          <a:spcPts val="0"/>
-                        </a:spcAft>
-                        <a:buNone/>
-                        <a:tabLst/>
-                        <a:defRPr sz="1800">
-                          <a:latin typeface="Liberation Sans" pitchFamily="34"/>
-                        </a:defRPr>
-                      </a:pPr>
-                      <a:r>
-                        <a:rPr lang="en-US" sz="1800" b="0" i="0" u="none" strike="noStrike" kern="1200" cap="none">
-                          <a:ln>
-                            <a:noFill/>
-                          </a:ln>
-                          <a:latin typeface="Liberation Sans" pitchFamily="34"/>
-                          <a:ea typeface="Noto Sans CJK SC" pitchFamily="2"/>
-                          <a:cs typeface="Lohit Devanagari" pitchFamily="2"/>
-                        </a:rPr>
-                        <a:t>Execution time</a:t>
-                      </a:r>
-                    </a:p>
-                  </a:txBody>
-                  <a:tcPr/>
-                </a:tc>
-                <a:tc>
-                  <a:txBody>
-                    <a:bodyPr/>
-                    <a:lstStyle/>
-                    <a:p>
-                      <a:pPr marL="0" marR="0" indent="0" rtl="0" hangingPunct="0">
-                        <a:lnSpc>
-                          <a:spcPct val="100000"/>
-                        </a:lnSpc>
-                        <a:spcBef>
-                          <a:spcPts val="0"/>
-                        </a:spcBef>
-                        <a:spcAft>
-                          <a:spcPts val="0"/>
-                        </a:spcAft>
-                        <a:tabLst/>
-                      </a:pPr>
-                      <a:endParaRPr lang="en-US" sz="1800" b="0" i="0" u="none" strike="noStrike" kern="1200" cap="none" dirty="0">
-                        <a:ln>
-                          <a:noFill/>
-                        </a:ln>
-                        <a:latin typeface="Liberation Sans" pitchFamily="18"/>
-                      </a:endParaRPr>
-                    </a:p>
-                  </a:txBody>
-                  <a:tcPr/>
-                </a:tc>
-                <a:tc>
-                  <a:txBody>
-                    <a:bodyPr/>
-                    <a:lstStyle/>
-                    <a:p>
-                      <a:pPr marL="0" marR="0" indent="0" rtl="0" hangingPunct="0">
-                        <a:lnSpc>
-                          <a:spcPct val="100000"/>
-                        </a:lnSpc>
-                        <a:spcBef>
-                          <a:spcPts val="0"/>
-                        </a:spcBef>
-                        <a:spcAft>
-                          <a:spcPts val="0"/>
-                        </a:spcAft>
-                        <a:tabLst/>
-                      </a:pPr>
-                      <a:endParaRPr lang="en-US" sz="1800" b="0" i="0" u="none" strike="noStrike" kern="1200" cap="none" dirty="0">
-                        <a:ln>
-                          <a:noFill/>
-                        </a:ln>
-                        <a:latin typeface="Liberation Sans" pitchFamily="18"/>
-                      </a:endParaRPr>
-                    </a:p>
-                  </a:txBody>
-                  <a:tcPr/>
-                </a:tc>
-                <a:tc>
-                  <a:txBody>
-                    <a:bodyPr/>
-                    <a:lstStyle/>
-                    <a:p>
-                      <a:pPr marL="0" marR="0" indent="0" rtl="0" hangingPunct="0">
-                        <a:lnSpc>
-                          <a:spcPct val="100000"/>
-                        </a:lnSpc>
-                        <a:spcBef>
-                          <a:spcPts val="0"/>
-                        </a:spcBef>
-                        <a:spcAft>
-                          <a:spcPts val="0"/>
-                        </a:spcAft>
-                        <a:tabLst/>
-                      </a:pPr>
-                      <a:endParaRPr lang="en-US" sz="1800" b="0" i="0" u="none" strike="noStrike" kern="1200" cap="none" dirty="0">
-                        <a:ln>
-                          <a:noFill/>
-                        </a:ln>
-                        <a:latin typeface="Liberation Sans" pitchFamily="18"/>
-                      </a:endParaRPr>
-                    </a:p>
-                  </a:txBody>
-                  <a:tcPr/>
-                </a:tc>
-                <a:tc>
-                  <a:txBody>
-                    <a:bodyPr/>
-                    <a:lstStyle/>
-                    <a:p>
-                      <a:pPr marL="0" marR="0" indent="0" rtl="0" hangingPunct="0">
-                        <a:lnSpc>
-                          <a:spcPct val="100000"/>
-                        </a:lnSpc>
-                        <a:spcBef>
-                          <a:spcPts val="0"/>
-                        </a:spcBef>
-                        <a:spcAft>
-                          <a:spcPts val="0"/>
-                        </a:spcAft>
-                        <a:tabLst/>
-                      </a:pPr>
-                      <a:endParaRPr lang="en-US" sz="1800" b="0" i="0" u="none" strike="noStrike" kern="1200" cap="none" dirty="0">
-                        <a:ln>
-                          <a:noFill/>
-                        </a:ln>
-                        <a:latin typeface="Liberation Sans" pitchFamily="18"/>
-                      </a:endParaRPr>
-                    </a:p>
-                  </a:txBody>
-                  <a:tcPr/>
-                </a:tc>
-                <a:tc>
-                  <a:txBody>
-                    <a:bodyPr/>
-                    <a:lstStyle/>
-                    <a:p>
-                      <a:pPr marL="0" marR="0" lvl="0" indent="0" rtl="0" hangingPunct="0">
-                        <a:lnSpc>
-                          <a:spcPct val="100000"/>
-                        </a:lnSpc>
-                        <a:spcBef>
-                          <a:spcPts val="0"/>
-                        </a:spcBef>
-                        <a:spcAft>
-                          <a:spcPts val="0"/>
-                        </a:spcAft>
-                        <a:buNone/>
-                        <a:tabLst/>
-                        <a:defRPr sz="1800">
-                          <a:latin typeface="Liberation Sans" pitchFamily="34"/>
-                        </a:defRPr>
-                      </a:pPr>
-                      <a:endParaRPr lang="en-US" sz="1800" b="0" i="0" u="none" strike="noStrike" kern="1200" cap="none" dirty="0">
-                        <a:ln>
-                          <a:noFill/>
-                        </a:ln>
-                        <a:latin typeface="Liberation Sans" pitchFamily="34"/>
-                        <a:ea typeface="Noto Sans CJK SC" pitchFamily="2"/>
-                        <a:cs typeface="Lohit Devanagari" pitchFamily="2"/>
-                      </a:endParaRPr>
-                    </a:p>
-                  </a:txBody>
-                  <a:tcPr/>
-                </a:tc>
-                <a:extLst>
-                  <a:ext uri="{0D108BD9-81ED-4DB2-BD59-A6C34878D82A}">
-                    <a16:rowId xmlns:a16="http://schemas.microsoft.com/office/drawing/2014/main" val="3690084186"/>
-                  </a:ext>
-                </a:extLst>
-              </a:tr>
-            </a:tbl>
-          </a:graphicData>
-        </a:graphic>
-      </p:graphicFrame>
-    </p:spTree>
-    <p:extLst>
-      <p:ext uri="{BB962C8B-B14F-4D97-AF65-F5344CB8AC3E}">
-        <p14:creationId xmlns:p14="http://schemas.microsoft.com/office/powerpoint/2010/main" val="2370266893"/>
-      </p:ext>
-    </p:extLst>
-  </p:cSld>
-  <p:clrMapOvr>
-    <a:masterClrMapping/>
-  </p:clrMapOvr>
-</p:sld>
-</file>
-
-<file path=ppt/slides/slide7.xml><?xml version="1.0" encoding="utf-8"?>
+<file path=ppt/slides/slide8.xml><?xml version="1.0" encoding="utf-8"?>
 <p:sld xmlns:a="http://schemas.openxmlformats.org/drawingml/2006/main" xmlns:r="http://schemas.openxmlformats.org/officeDocument/2006/relationships" xmlns:p="http://schemas.openxmlformats.org/presentationml/2006/main">
   <p:cSld name="page2">
     <p:spTree>
@@ -8277,7 +9478,7 @@
 </p:sld>
 </file>
 
-<file path=ppt/slides/slide8.xml><?xml version="1.0" encoding="utf-8"?>
+<file path=ppt/slides/slide9.xml><?xml version="1.0" encoding="utf-8"?>
 <p:sld xmlns:a="http://schemas.openxmlformats.org/drawingml/2006/main" xmlns:r="http://schemas.openxmlformats.org/officeDocument/2006/relationships" xmlns:p="http://schemas.openxmlformats.org/presentationml/2006/main">
   <p:cSld>
     <p:spTree>

</xml_diff>